<commit_message>
Abbildungen in emf konvertiert
</commit_message>
<xml_diff>
--- a/Präsentation/Abschluss_Präsentation.pptx
+++ b/Präsentation/Abschluss_Präsentation.pptx
@@ -2,22 +2,23 @@
 <file path=ppt/presentation.xml><?xml version="1.0" encoding="utf-8"?>
 <p:presentation xmlns:a="http://schemas.openxmlformats.org/drawingml/2006/main" xmlns:r="http://schemas.openxmlformats.org/officeDocument/2006/relationships" xmlns:p="http://schemas.openxmlformats.org/presentationml/2006/main" saveSubsetFonts="1">
   <p:sldMasterIdLst>
-    <p:sldMasterId id="2147483648" r:id="rId1"/>
+    <p:sldMasterId id="2147483648" r:id="rId2"/>
   </p:sldMasterIdLst>
   <p:notesMasterIdLst>
-    <p:notesMasterId r:id="rId9"/>
+    <p:notesMasterId r:id="rId11"/>
   </p:notesMasterIdLst>
   <p:handoutMasterIdLst>
-    <p:handoutMasterId r:id="rId10"/>
+    <p:handoutMasterId r:id="rId12"/>
   </p:handoutMasterIdLst>
   <p:sldIdLst>
-    <p:sldId id="256" r:id="rId2"/>
-    <p:sldId id="257" r:id="rId3"/>
-    <p:sldId id="258" r:id="rId4"/>
-    <p:sldId id="259" r:id="rId5"/>
-    <p:sldId id="262" r:id="rId6"/>
-    <p:sldId id="263" r:id="rId7"/>
-    <p:sldId id="265" r:id="rId8"/>
+    <p:sldId id="256" r:id="rId3"/>
+    <p:sldId id="266" r:id="rId4"/>
+    <p:sldId id="257" r:id="rId5"/>
+    <p:sldId id="258" r:id="rId6"/>
+    <p:sldId id="259" r:id="rId7"/>
+    <p:sldId id="262" r:id="rId8"/>
+    <p:sldId id="263" r:id="rId9"/>
+    <p:sldId id="265" r:id="rId10"/>
   </p:sldIdLst>
   <p:sldSz cx="9144000" cy="6858000" type="screen4x3"/>
   <p:notesSz cx="6858000" cy="9144000"/>
@@ -168,6 +169,10 @@
 </p:presentation>
 </file>
 
+<file path=ppt/revisionInfo.xml><?xml version="1.0" encoding="utf-8"?>
+<p1510:revInfo xmlns:a="http://schemas.openxmlformats.org/drawingml/2006/main" xmlns:r="http://schemas.openxmlformats.org/officeDocument/2006/relationships" xmlns:p1510="http://schemas.microsoft.com/office/powerpoint/2015/10/main"/>
+</file>
+
 <file path=ppt/handoutMasters/handoutMaster1.xml><?xml version="1.0" encoding="utf-8"?>
 <p:handoutMaster xmlns:a="http://schemas.openxmlformats.org/drawingml/2006/main" xmlns:r="http://schemas.openxmlformats.org/officeDocument/2006/relationships" xmlns:p="http://schemas.openxmlformats.org/presentationml/2006/main">
   <p:cSld>
@@ -285,7 +290,7 @@
             <a:fld id="{A32DC80D-291A-4ABB-A78B-0417274A267C}" type="datetime4">
               <a:rPr lang="de-DE"/>
               <a:pPr/>
-              <a:t>20. Juni 2017</a:t>
+              <a:t>5. Juli 2017</a:t>
             </a:fld>
             <a:endParaRPr lang="de-DE"/>
           </a:p>
@@ -668,7 +673,7 @@
             <a:fld id="{065B079B-E513-489A-8A1B-D7C78493EA86}" type="datetime4">
               <a:rPr lang="de-DE"/>
               <a:pPr/>
-              <a:t>20. Juni 2017</a:t>
+              <a:t>5. Juli 2017</a:t>
             </a:fld>
             <a:endParaRPr lang="de-DE"/>
           </a:p>
@@ -1599,7 +1604,7 @@
                 <a:tabLst/>
                 <a:defRPr/>
               </a:pPr>
-              <a:t>20.06.2017</a:t>
+              <a:t>05.07.2017</a:t>
             </a:fld>
             <a:r>
               <a:rPr kumimoji="0" lang="de-DE" sz="1000" b="0" i="0" u="none" strike="noStrike" kern="1200" cap="none" spc="0" normalizeH="0" baseline="0" noProof="0" dirty="0">
@@ -1853,904 +1858,7 @@
 </p:sldLayout>
 </file>
 
-<file path=ppt/slideLayouts/slideLayout2.xml><?xml version="1.0" encoding="utf-8"?>
-<p:sldLayout xmlns:a="http://schemas.openxmlformats.org/drawingml/2006/main" xmlns:r="http://schemas.openxmlformats.org/officeDocument/2006/relationships" xmlns:p="http://schemas.openxmlformats.org/presentationml/2006/main" type="obj" preserve="1">
-  <p:cSld name="Titel und Inhalt">
-    <p:spTree>
-      <p:nvGrpSpPr>
-        <p:cNvPr id="1" name=""/>
-        <p:cNvGrpSpPr/>
-        <p:nvPr/>
-      </p:nvGrpSpPr>
-      <p:grpSpPr>
-        <a:xfrm>
-          <a:off x="0" y="0"/>
-          <a:ext cx="0" cy="0"/>
-          <a:chOff x="0" y="0"/>
-          <a:chExt cx="0" cy="0"/>
-        </a:xfrm>
-      </p:grpSpPr>
-      <p:sp>
-        <p:nvSpPr>
-          <p:cNvPr id="2" name="Titel 1"/>
-          <p:cNvSpPr>
-            <a:spLocks noGrp="1"/>
-          </p:cNvSpPr>
-          <p:nvPr>
-            <p:ph type="title"/>
-          </p:nvPr>
-        </p:nvSpPr>
-        <p:spPr/>
-        <p:txBody>
-          <a:bodyPr/>
-          <a:lstStyle/>
-          <a:p>
-            <a:r>
-              <a:rPr lang="de-DE"/>
-              <a:t>Titelmasterformat durch Klicken bearbeiten</a:t>
-            </a:r>
-          </a:p>
-        </p:txBody>
-      </p:sp>
-      <p:sp>
-        <p:nvSpPr>
-          <p:cNvPr id="3" name="Inhaltsplatzhalter 2"/>
-          <p:cNvSpPr>
-            <a:spLocks noGrp="1"/>
-          </p:cNvSpPr>
-          <p:nvPr>
-            <p:ph idx="1"/>
-          </p:nvPr>
-        </p:nvSpPr>
-        <p:spPr>
-          <a:xfrm>
-            <a:off x="360000" y="1620000"/>
-            <a:ext cx="6823569" cy="4479943"/>
-          </a:xfrm>
-        </p:spPr>
-        <p:txBody>
-          <a:bodyPr/>
-          <a:lstStyle/>
-          <a:p>
-            <a:pPr lvl="0"/>
-            <a:r>
-              <a:rPr lang="de-DE" dirty="0"/>
-              <a:t>Textmasterformate durch Klicken bearbeiten</a:t>
-            </a:r>
-          </a:p>
-          <a:p>
-            <a:pPr lvl="1"/>
-            <a:r>
-              <a:rPr lang="de-DE" dirty="0"/>
-              <a:t>Zweite Ebene</a:t>
-            </a:r>
-          </a:p>
-          <a:p>
-            <a:pPr lvl="2"/>
-            <a:r>
-              <a:rPr lang="de-DE" dirty="0"/>
-              <a:t>Dritte Ebene</a:t>
-            </a:r>
-          </a:p>
-          <a:p>
-            <a:pPr lvl="3"/>
-            <a:r>
-              <a:rPr lang="de-DE" dirty="0"/>
-              <a:t>Vierte Ebene</a:t>
-            </a:r>
-          </a:p>
-          <a:p>
-            <a:pPr lvl="4"/>
-            <a:r>
-              <a:rPr lang="de-DE" dirty="0"/>
-              <a:t>Fünfte Ebene</a:t>
-            </a:r>
-          </a:p>
-        </p:txBody>
-      </p:sp>
-    </p:spTree>
-  </p:cSld>
-  <p:clrMapOvr>
-    <a:masterClrMapping/>
-  </p:clrMapOvr>
-</p:sldLayout>
-</file>
-
-<file path=ppt/slideLayouts/slideLayout3.xml><?xml version="1.0" encoding="utf-8"?>
-<p:sldLayout xmlns:a="http://schemas.openxmlformats.org/drawingml/2006/main" xmlns:r="http://schemas.openxmlformats.org/officeDocument/2006/relationships" xmlns:p="http://schemas.openxmlformats.org/presentationml/2006/main" type="secHead" preserve="1">
-  <p:cSld name="Abschnittsüberschrift">
-    <p:spTree>
-      <p:nvGrpSpPr>
-        <p:cNvPr id="1" name=""/>
-        <p:cNvGrpSpPr/>
-        <p:nvPr/>
-      </p:nvGrpSpPr>
-      <p:grpSpPr>
-        <a:xfrm>
-          <a:off x="0" y="0"/>
-          <a:ext cx="0" cy="0"/>
-          <a:chOff x="0" y="0"/>
-          <a:chExt cx="0" cy="0"/>
-        </a:xfrm>
-      </p:grpSpPr>
-      <p:sp>
-        <p:nvSpPr>
-          <p:cNvPr id="2" name="Titel 1"/>
-          <p:cNvSpPr>
-            <a:spLocks noGrp="1"/>
-          </p:cNvSpPr>
-          <p:nvPr>
-            <p:ph type="title"/>
-          </p:nvPr>
-        </p:nvSpPr>
-        <p:spPr>
-          <a:xfrm>
-            <a:off x="722313" y="4406900"/>
-            <a:ext cx="6421455" cy="1362075"/>
-          </a:xfrm>
-        </p:spPr>
-        <p:txBody>
-          <a:bodyPr anchor="t"/>
-          <a:lstStyle>
-            <a:lvl1pPr algn="l">
-              <a:defRPr sz="3200" b="1" cap="all"/>
-            </a:lvl1pPr>
-          </a:lstStyle>
-          <a:p>
-            <a:r>
-              <a:rPr lang="de-DE" dirty="0"/>
-              <a:t>Titelmasterformat durch Klicken bearbeiten</a:t>
-            </a:r>
-          </a:p>
-        </p:txBody>
-      </p:sp>
-      <p:sp>
-        <p:nvSpPr>
-          <p:cNvPr id="3" name="Textplatzhalter 2"/>
-          <p:cNvSpPr>
-            <a:spLocks noGrp="1"/>
-          </p:cNvSpPr>
-          <p:nvPr>
-            <p:ph type="body" idx="1"/>
-          </p:nvPr>
-        </p:nvSpPr>
-        <p:spPr>
-          <a:xfrm>
-            <a:off x="722313" y="2906713"/>
-            <a:ext cx="6421455" cy="1500187"/>
-          </a:xfrm>
-        </p:spPr>
-        <p:txBody>
-          <a:bodyPr anchor="b"/>
-          <a:lstStyle>
-            <a:lvl1pPr marL="0" indent="0">
-              <a:buNone/>
-              <a:defRPr sz="2000"/>
-            </a:lvl1pPr>
-            <a:lvl2pPr marL="457200" indent="0">
-              <a:buNone/>
-              <a:defRPr sz="1800"/>
-            </a:lvl2pPr>
-            <a:lvl3pPr marL="914400" indent="0">
-              <a:buNone/>
-              <a:defRPr sz="1600"/>
-            </a:lvl3pPr>
-            <a:lvl4pPr marL="1371600" indent="0">
-              <a:buNone/>
-              <a:defRPr sz="1400"/>
-            </a:lvl4pPr>
-            <a:lvl5pPr marL="1828800" indent="0">
-              <a:buNone/>
-              <a:defRPr sz="1400"/>
-            </a:lvl5pPr>
-            <a:lvl6pPr marL="2286000" indent="0">
-              <a:buNone/>
-              <a:defRPr sz="1400"/>
-            </a:lvl6pPr>
-            <a:lvl7pPr marL="2743200" indent="0">
-              <a:buNone/>
-              <a:defRPr sz="1400"/>
-            </a:lvl7pPr>
-            <a:lvl8pPr marL="3200400" indent="0">
-              <a:buNone/>
-              <a:defRPr sz="1400"/>
-            </a:lvl8pPr>
-            <a:lvl9pPr marL="3657600" indent="0">
-              <a:buNone/>
-              <a:defRPr sz="1400"/>
-            </a:lvl9pPr>
-          </a:lstStyle>
-          <a:p>
-            <a:pPr lvl="0"/>
-            <a:r>
-              <a:rPr lang="de-DE"/>
-              <a:t>Textmasterformate durch Klicken bearbeiten</a:t>
-            </a:r>
-          </a:p>
-        </p:txBody>
-      </p:sp>
-    </p:spTree>
-  </p:cSld>
-  <p:clrMapOvr>
-    <a:masterClrMapping/>
-  </p:clrMapOvr>
-</p:sldLayout>
-</file>
-
-<file path=ppt/slideLayouts/slideLayout4.xml><?xml version="1.0" encoding="utf-8"?>
-<p:sldLayout xmlns:a="http://schemas.openxmlformats.org/drawingml/2006/main" xmlns:r="http://schemas.openxmlformats.org/officeDocument/2006/relationships" xmlns:p="http://schemas.openxmlformats.org/presentationml/2006/main" type="twoObj" preserve="1">
-  <p:cSld name="Zwei Inhalte">
-    <p:spTree>
-      <p:nvGrpSpPr>
-        <p:cNvPr id="1" name=""/>
-        <p:cNvGrpSpPr/>
-        <p:nvPr/>
-      </p:nvGrpSpPr>
-      <p:grpSpPr>
-        <a:xfrm>
-          <a:off x="0" y="0"/>
-          <a:ext cx="0" cy="0"/>
-          <a:chOff x="0" y="0"/>
-          <a:chExt cx="0" cy="0"/>
-        </a:xfrm>
-      </p:grpSpPr>
-      <p:sp>
-        <p:nvSpPr>
-          <p:cNvPr id="2" name="Titel 1"/>
-          <p:cNvSpPr>
-            <a:spLocks noGrp="1"/>
-          </p:cNvSpPr>
-          <p:nvPr>
-            <p:ph type="title"/>
-          </p:nvPr>
-        </p:nvSpPr>
-        <p:spPr/>
-        <p:txBody>
-          <a:bodyPr/>
-          <a:lstStyle/>
-          <a:p>
-            <a:r>
-              <a:rPr lang="de-DE"/>
-              <a:t>Titelmasterformat durch Klicken bearbeiten</a:t>
-            </a:r>
-          </a:p>
-        </p:txBody>
-      </p:sp>
-      <p:sp>
-        <p:nvSpPr>
-          <p:cNvPr id="3" name="Inhaltsplatzhalter 2"/>
-          <p:cNvSpPr>
-            <a:spLocks noGrp="1"/>
-          </p:cNvSpPr>
-          <p:nvPr>
-            <p:ph sz="half" idx="1"/>
-          </p:nvPr>
-        </p:nvSpPr>
-        <p:spPr>
-          <a:xfrm>
-            <a:off x="358775" y="1592263"/>
-            <a:ext cx="4135438" cy="4551381"/>
-          </a:xfrm>
-        </p:spPr>
-        <p:txBody>
-          <a:bodyPr/>
-          <a:lstStyle>
-            <a:lvl1pPr marL="0" indent="0">
-              <a:defRPr sz="2000"/>
-            </a:lvl1pPr>
-            <a:lvl2pPr>
-              <a:defRPr sz="2000"/>
-            </a:lvl2pPr>
-            <a:lvl3pPr>
-              <a:defRPr sz="2000"/>
-            </a:lvl3pPr>
-            <a:lvl4pPr>
-              <a:defRPr sz="1800"/>
-            </a:lvl4pPr>
-            <a:lvl5pPr>
-              <a:defRPr sz="1800"/>
-            </a:lvl5pPr>
-            <a:lvl6pPr>
-              <a:defRPr sz="1800"/>
-            </a:lvl6pPr>
-            <a:lvl7pPr>
-              <a:defRPr sz="1800"/>
-            </a:lvl7pPr>
-            <a:lvl8pPr>
-              <a:defRPr sz="1800"/>
-            </a:lvl8pPr>
-            <a:lvl9pPr>
-              <a:defRPr sz="1800"/>
-            </a:lvl9pPr>
-          </a:lstStyle>
-          <a:p>
-            <a:pPr lvl="0"/>
-            <a:r>
-              <a:rPr lang="de-DE" dirty="0"/>
-              <a:t>Textmasterformate durch Klicken bearbeiten</a:t>
-            </a:r>
-          </a:p>
-          <a:p>
-            <a:pPr lvl="1"/>
-            <a:r>
-              <a:rPr lang="de-DE" dirty="0"/>
-              <a:t>Zweite Ebene</a:t>
-            </a:r>
-          </a:p>
-          <a:p>
-            <a:pPr lvl="2"/>
-            <a:r>
-              <a:rPr lang="de-DE" dirty="0"/>
-              <a:t>Dritte Ebene</a:t>
-            </a:r>
-          </a:p>
-          <a:p>
-            <a:pPr lvl="3"/>
-            <a:r>
-              <a:rPr lang="de-DE" dirty="0"/>
-              <a:t>Vierte Ebene</a:t>
-            </a:r>
-          </a:p>
-          <a:p>
-            <a:pPr lvl="4"/>
-            <a:r>
-              <a:rPr lang="de-DE" dirty="0"/>
-              <a:t>Fünfte Ebene</a:t>
-            </a:r>
-          </a:p>
-        </p:txBody>
-      </p:sp>
-      <p:sp>
-        <p:nvSpPr>
-          <p:cNvPr id="4" name="Inhaltsplatzhalter 3"/>
-          <p:cNvSpPr>
-            <a:spLocks noGrp="1"/>
-          </p:cNvSpPr>
-          <p:nvPr>
-            <p:ph sz="half" idx="2"/>
-          </p:nvPr>
-        </p:nvSpPr>
-        <p:spPr>
-          <a:xfrm>
-            <a:off x="4786314" y="1592263"/>
-            <a:ext cx="4105274" cy="4551381"/>
-          </a:xfrm>
-        </p:spPr>
-        <p:txBody>
-          <a:bodyPr/>
-          <a:lstStyle>
-            <a:lvl1pPr marL="0" indent="0">
-              <a:defRPr sz="2000"/>
-            </a:lvl1pPr>
-            <a:lvl2pPr>
-              <a:defRPr sz="2000"/>
-            </a:lvl2pPr>
-            <a:lvl3pPr>
-              <a:defRPr sz="2000"/>
-            </a:lvl3pPr>
-            <a:lvl4pPr>
-              <a:defRPr sz="1800"/>
-            </a:lvl4pPr>
-            <a:lvl5pPr>
-              <a:defRPr sz="1800"/>
-            </a:lvl5pPr>
-            <a:lvl6pPr>
-              <a:defRPr sz="1800"/>
-            </a:lvl6pPr>
-            <a:lvl7pPr>
-              <a:defRPr sz="1800"/>
-            </a:lvl7pPr>
-            <a:lvl8pPr>
-              <a:defRPr sz="1800"/>
-            </a:lvl8pPr>
-            <a:lvl9pPr>
-              <a:defRPr sz="1800"/>
-            </a:lvl9pPr>
-          </a:lstStyle>
-          <a:p>
-            <a:pPr lvl="0"/>
-            <a:r>
-              <a:rPr lang="de-DE" dirty="0"/>
-              <a:t>Textmasterformate durch Klicken bearbeiten</a:t>
-            </a:r>
-          </a:p>
-          <a:p>
-            <a:pPr lvl="1"/>
-            <a:r>
-              <a:rPr lang="de-DE" dirty="0"/>
-              <a:t>Zweite Ebene</a:t>
-            </a:r>
-          </a:p>
-          <a:p>
-            <a:pPr lvl="2"/>
-            <a:r>
-              <a:rPr lang="de-DE" dirty="0"/>
-              <a:t>Dritte Ebene</a:t>
-            </a:r>
-          </a:p>
-          <a:p>
-            <a:pPr lvl="3"/>
-            <a:r>
-              <a:rPr lang="de-DE" dirty="0"/>
-              <a:t>Vierte Ebene</a:t>
-            </a:r>
-          </a:p>
-          <a:p>
-            <a:pPr lvl="4"/>
-            <a:r>
-              <a:rPr lang="de-DE" dirty="0"/>
-              <a:t>Fünfte Ebene</a:t>
-            </a:r>
-          </a:p>
-        </p:txBody>
-      </p:sp>
-    </p:spTree>
-  </p:cSld>
-  <p:clrMapOvr>
-    <a:masterClrMapping/>
-  </p:clrMapOvr>
-</p:sldLayout>
-</file>
-
-<file path=ppt/slideLayouts/slideLayout5.xml><?xml version="1.0" encoding="utf-8"?>
-<p:sldLayout xmlns:a="http://schemas.openxmlformats.org/drawingml/2006/main" xmlns:r="http://schemas.openxmlformats.org/officeDocument/2006/relationships" xmlns:p="http://schemas.openxmlformats.org/presentationml/2006/main" type="titleOnly" preserve="1">
-  <p:cSld name="Nur Titel">
-    <p:spTree>
-      <p:nvGrpSpPr>
-        <p:cNvPr id="1" name=""/>
-        <p:cNvGrpSpPr/>
-        <p:nvPr/>
-      </p:nvGrpSpPr>
-      <p:grpSpPr>
-        <a:xfrm>
-          <a:off x="0" y="0"/>
-          <a:ext cx="0" cy="0"/>
-          <a:chOff x="0" y="0"/>
-          <a:chExt cx="0" cy="0"/>
-        </a:xfrm>
-      </p:grpSpPr>
-      <p:sp>
-        <p:nvSpPr>
-          <p:cNvPr id="2" name="Titel 1"/>
-          <p:cNvSpPr>
-            <a:spLocks noGrp="1"/>
-          </p:cNvSpPr>
-          <p:nvPr>
-            <p:ph type="title"/>
-          </p:nvPr>
-        </p:nvSpPr>
-        <p:spPr/>
-        <p:txBody>
-          <a:bodyPr/>
-          <a:lstStyle/>
-          <a:p>
-            <a:r>
-              <a:rPr lang="de-DE" dirty="0"/>
-              <a:t>Titelmasterformat durch Klicken bearbeiten</a:t>
-            </a:r>
-          </a:p>
-        </p:txBody>
-      </p:sp>
-    </p:spTree>
-  </p:cSld>
-  <p:clrMapOvr>
-    <a:masterClrMapping/>
-  </p:clrMapOvr>
-</p:sldLayout>
-</file>
-
-<file path=ppt/slideLayouts/slideLayout6.xml><?xml version="1.0" encoding="utf-8"?>
-<p:sldLayout xmlns:a="http://schemas.openxmlformats.org/drawingml/2006/main" xmlns:r="http://schemas.openxmlformats.org/officeDocument/2006/relationships" xmlns:p="http://schemas.openxmlformats.org/presentationml/2006/main" type="blank" preserve="1">
-  <p:cSld name="Leer">
-    <p:spTree>
-      <p:nvGrpSpPr>
-        <p:cNvPr id="1" name=""/>
-        <p:cNvGrpSpPr/>
-        <p:nvPr/>
-      </p:nvGrpSpPr>
-      <p:grpSpPr>
-        <a:xfrm>
-          <a:off x="0" y="0"/>
-          <a:ext cx="0" cy="0"/>
-          <a:chOff x="0" y="0"/>
-          <a:chExt cx="0" cy="0"/>
-        </a:xfrm>
-      </p:grpSpPr>
-    </p:spTree>
-  </p:cSld>
-  <p:clrMapOvr>
-    <a:masterClrMapping/>
-  </p:clrMapOvr>
-</p:sldLayout>
-</file>
-
-<file path=ppt/slideLayouts/slideLayout7.xml><?xml version="1.0" encoding="utf-8"?>
-<p:sldLayout xmlns:a="http://schemas.openxmlformats.org/drawingml/2006/main" xmlns:r="http://schemas.openxmlformats.org/officeDocument/2006/relationships" xmlns:p="http://schemas.openxmlformats.org/presentationml/2006/main" preserve="1" userDrawn="1">
-  <p:cSld name="Inhalt mit Überschrift">
-    <p:spTree>
-      <p:nvGrpSpPr>
-        <p:cNvPr id="1" name=""/>
-        <p:cNvGrpSpPr/>
-        <p:nvPr/>
-      </p:nvGrpSpPr>
-      <p:grpSpPr>
-        <a:xfrm>
-          <a:off x="0" y="0"/>
-          <a:ext cx="0" cy="0"/>
-          <a:chOff x="0" y="0"/>
-          <a:chExt cx="0" cy="0"/>
-        </a:xfrm>
-      </p:grpSpPr>
-      <p:sp>
-        <p:nvSpPr>
-          <p:cNvPr id="3" name="Inhaltsplatzhalter 2"/>
-          <p:cNvSpPr>
-            <a:spLocks noGrp="1"/>
-          </p:cNvSpPr>
-          <p:nvPr>
-            <p:ph idx="1"/>
-          </p:nvPr>
-        </p:nvSpPr>
-        <p:spPr>
-          <a:xfrm>
-            <a:off x="3857620" y="1620000"/>
-            <a:ext cx="5000660" cy="4506163"/>
-          </a:xfrm>
-        </p:spPr>
-        <p:txBody>
-          <a:bodyPr/>
-          <a:lstStyle>
-            <a:lvl1pPr>
-              <a:defRPr sz="2000"/>
-            </a:lvl1pPr>
-            <a:lvl2pPr>
-              <a:defRPr sz="2000"/>
-            </a:lvl2pPr>
-            <a:lvl3pPr>
-              <a:defRPr sz="1600"/>
-            </a:lvl3pPr>
-            <a:lvl4pPr>
-              <a:defRPr sz="1600"/>
-            </a:lvl4pPr>
-            <a:lvl5pPr>
-              <a:defRPr sz="1600"/>
-            </a:lvl5pPr>
-            <a:lvl6pPr>
-              <a:defRPr sz="2000"/>
-            </a:lvl6pPr>
-            <a:lvl7pPr>
-              <a:defRPr sz="2000"/>
-            </a:lvl7pPr>
-            <a:lvl8pPr>
-              <a:defRPr sz="2000"/>
-            </a:lvl8pPr>
-            <a:lvl9pPr>
-              <a:defRPr sz="2000"/>
-            </a:lvl9pPr>
-          </a:lstStyle>
-          <a:p>
-            <a:pPr lvl="0"/>
-            <a:r>
-              <a:rPr lang="de-DE" dirty="0"/>
-              <a:t>Textmasterformate durch Klicken bearbeiten</a:t>
-            </a:r>
-          </a:p>
-          <a:p>
-            <a:pPr lvl="1"/>
-            <a:r>
-              <a:rPr lang="de-DE" dirty="0"/>
-              <a:t>Zweite Ebene</a:t>
-            </a:r>
-          </a:p>
-          <a:p>
-            <a:pPr lvl="2"/>
-            <a:r>
-              <a:rPr lang="de-DE" dirty="0"/>
-              <a:t>Dritte Ebene</a:t>
-            </a:r>
-          </a:p>
-          <a:p>
-            <a:pPr lvl="3"/>
-            <a:r>
-              <a:rPr lang="de-DE" dirty="0"/>
-              <a:t>Vierte Ebene</a:t>
-            </a:r>
-          </a:p>
-          <a:p>
-            <a:pPr lvl="4"/>
-            <a:r>
-              <a:rPr lang="de-DE" dirty="0"/>
-              <a:t>Fünfte Ebene</a:t>
-            </a:r>
-          </a:p>
-        </p:txBody>
-      </p:sp>
-      <p:sp>
-        <p:nvSpPr>
-          <p:cNvPr id="4" name="Textplatzhalter 3"/>
-          <p:cNvSpPr>
-            <a:spLocks noGrp="1"/>
-          </p:cNvSpPr>
-          <p:nvPr>
-            <p:ph type="body" sz="half" idx="2"/>
-          </p:nvPr>
-        </p:nvSpPr>
-        <p:spPr>
-          <a:xfrm>
-            <a:off x="358776" y="1620000"/>
-            <a:ext cx="3106738" cy="4506163"/>
-          </a:xfrm>
-        </p:spPr>
-        <p:txBody>
-          <a:bodyPr/>
-          <a:lstStyle>
-            <a:lvl1pPr marL="0" indent="0">
-              <a:buNone/>
-              <a:defRPr sz="2000"/>
-            </a:lvl1pPr>
-            <a:lvl2pPr marL="457200" indent="0">
-              <a:buNone/>
-              <a:defRPr sz="1200"/>
-            </a:lvl2pPr>
-            <a:lvl3pPr marL="914400" indent="0">
-              <a:buNone/>
-              <a:defRPr sz="1000"/>
-            </a:lvl3pPr>
-            <a:lvl4pPr marL="1371600" indent="0">
-              <a:buNone/>
-              <a:defRPr sz="900"/>
-            </a:lvl4pPr>
-            <a:lvl5pPr marL="1828800" indent="0">
-              <a:buNone/>
-              <a:defRPr sz="900"/>
-            </a:lvl5pPr>
-            <a:lvl6pPr marL="2286000" indent="0">
-              <a:buNone/>
-              <a:defRPr sz="900"/>
-            </a:lvl6pPr>
-            <a:lvl7pPr marL="2743200" indent="0">
-              <a:buNone/>
-              <a:defRPr sz="900"/>
-            </a:lvl7pPr>
-            <a:lvl8pPr marL="3200400" indent="0">
-              <a:buNone/>
-              <a:defRPr sz="900"/>
-            </a:lvl8pPr>
-            <a:lvl9pPr marL="3657600" indent="0">
-              <a:buNone/>
-              <a:defRPr sz="900"/>
-            </a:lvl9pPr>
-          </a:lstStyle>
-          <a:p>
-            <a:pPr lvl="0"/>
-            <a:r>
-              <a:rPr lang="de-DE" dirty="0"/>
-              <a:t>Textmasterformate durch Klicken bearbeiten</a:t>
-            </a:r>
-          </a:p>
-        </p:txBody>
-      </p:sp>
-      <p:sp>
-        <p:nvSpPr>
-          <p:cNvPr id="5" name="Titel 1"/>
-          <p:cNvSpPr>
-            <a:spLocks noGrp="1"/>
-          </p:cNvSpPr>
-          <p:nvPr>
-            <p:ph type="title"/>
-          </p:nvPr>
-        </p:nvSpPr>
-        <p:spPr>
-          <a:xfrm>
-            <a:off x="358775" y="488950"/>
-            <a:ext cx="6840000" cy="838200"/>
-          </a:xfrm>
-        </p:spPr>
-        <p:txBody>
-          <a:bodyPr/>
-          <a:lstStyle/>
-          <a:p>
-            <a:r>
-              <a:rPr lang="de-DE"/>
-              <a:t>Titelmasterformat durch Klicken bearbeiten</a:t>
-            </a:r>
-          </a:p>
-        </p:txBody>
-      </p:sp>
-    </p:spTree>
-  </p:cSld>
-  <p:clrMapOvr>
-    <a:masterClrMapping/>
-  </p:clrMapOvr>
-</p:sldLayout>
-</file>
-
-<file path=ppt/slideLayouts/slideLayout8.xml><?xml version="1.0" encoding="utf-8"?>
-<p:sldLayout xmlns:a="http://schemas.openxmlformats.org/drawingml/2006/main" xmlns:r="http://schemas.openxmlformats.org/officeDocument/2006/relationships" xmlns:p="http://schemas.openxmlformats.org/presentationml/2006/main" type="picTx" preserve="1">
-  <p:cSld name="Bild mit Überschrift">
-    <p:spTree>
-      <p:nvGrpSpPr>
-        <p:cNvPr id="1" name=""/>
-        <p:cNvGrpSpPr/>
-        <p:nvPr/>
-      </p:nvGrpSpPr>
-      <p:grpSpPr>
-        <a:xfrm>
-          <a:off x="0" y="0"/>
-          <a:ext cx="0" cy="0"/>
-          <a:chOff x="0" y="0"/>
-          <a:chExt cx="0" cy="0"/>
-        </a:xfrm>
-      </p:grpSpPr>
-      <p:sp>
-        <p:nvSpPr>
-          <p:cNvPr id="2" name="Titel 1"/>
-          <p:cNvSpPr>
-            <a:spLocks noGrp="1"/>
-          </p:cNvSpPr>
-          <p:nvPr>
-            <p:ph type="title"/>
-          </p:nvPr>
-        </p:nvSpPr>
-        <p:spPr>
-          <a:xfrm>
-            <a:off x="1792288" y="4800600"/>
-            <a:ext cx="5486400" cy="566738"/>
-          </a:xfrm>
-        </p:spPr>
-        <p:txBody>
-          <a:bodyPr anchor="b"/>
-          <a:lstStyle>
-            <a:lvl1pPr algn="l">
-              <a:defRPr sz="2000" b="1"/>
-            </a:lvl1pPr>
-          </a:lstStyle>
-          <a:p>
-            <a:r>
-              <a:rPr lang="de-DE"/>
-              <a:t>Titelmasterformat durch Klicken bearbeiten</a:t>
-            </a:r>
-          </a:p>
-        </p:txBody>
-      </p:sp>
-      <p:sp>
-        <p:nvSpPr>
-          <p:cNvPr id="3" name="Bildplatzhalter 2"/>
-          <p:cNvSpPr>
-            <a:spLocks noGrp="1"/>
-          </p:cNvSpPr>
-          <p:nvPr>
-            <p:ph type="pic" idx="1"/>
-          </p:nvPr>
-        </p:nvSpPr>
-        <p:spPr>
-          <a:xfrm>
-            <a:off x="1792288" y="1928801"/>
-            <a:ext cx="5486400" cy="2798773"/>
-          </a:xfrm>
-        </p:spPr>
-        <p:txBody>
-          <a:bodyPr/>
-          <a:lstStyle>
-            <a:lvl1pPr marL="0" indent="0">
-              <a:buNone/>
-              <a:defRPr sz="3200"/>
-            </a:lvl1pPr>
-            <a:lvl2pPr marL="457200" indent="0">
-              <a:buNone/>
-              <a:defRPr sz="2800"/>
-            </a:lvl2pPr>
-            <a:lvl3pPr marL="914400" indent="0">
-              <a:buNone/>
-              <a:defRPr sz="2400"/>
-            </a:lvl3pPr>
-            <a:lvl4pPr marL="1371600" indent="0">
-              <a:buNone/>
-              <a:defRPr sz="2000"/>
-            </a:lvl4pPr>
-            <a:lvl5pPr marL="1828800" indent="0">
-              <a:buNone/>
-              <a:defRPr sz="2000"/>
-            </a:lvl5pPr>
-            <a:lvl6pPr marL="2286000" indent="0">
-              <a:buNone/>
-              <a:defRPr sz="2000"/>
-            </a:lvl6pPr>
-            <a:lvl7pPr marL="2743200" indent="0">
-              <a:buNone/>
-              <a:defRPr sz="2000"/>
-            </a:lvl7pPr>
-            <a:lvl8pPr marL="3200400" indent="0">
-              <a:buNone/>
-              <a:defRPr sz="2000"/>
-            </a:lvl8pPr>
-            <a:lvl9pPr marL="3657600" indent="0">
-              <a:buNone/>
-              <a:defRPr sz="2000"/>
-            </a:lvl9pPr>
-          </a:lstStyle>
-          <a:p>
-            <a:r>
-              <a:rPr lang="de-DE"/>
-              <a:t>Bild durch Klicken auf Symbol hinzufügen</a:t>
-            </a:r>
-          </a:p>
-        </p:txBody>
-      </p:sp>
-      <p:sp>
-        <p:nvSpPr>
-          <p:cNvPr id="4" name="Textplatzhalter 3"/>
-          <p:cNvSpPr>
-            <a:spLocks noGrp="1"/>
-          </p:cNvSpPr>
-          <p:nvPr>
-            <p:ph type="body" sz="half" idx="2"/>
-          </p:nvPr>
-        </p:nvSpPr>
-        <p:spPr>
-          <a:xfrm>
-            <a:off x="1792288" y="5367338"/>
-            <a:ext cx="5486400" cy="804862"/>
-          </a:xfrm>
-        </p:spPr>
-        <p:txBody>
-          <a:bodyPr/>
-          <a:lstStyle>
-            <a:lvl1pPr marL="0" indent="0">
-              <a:buNone/>
-              <a:defRPr sz="1400"/>
-            </a:lvl1pPr>
-            <a:lvl2pPr marL="457200" indent="0">
-              <a:buNone/>
-              <a:defRPr sz="1200"/>
-            </a:lvl2pPr>
-            <a:lvl3pPr marL="914400" indent="0">
-              <a:buNone/>
-              <a:defRPr sz="1000"/>
-            </a:lvl3pPr>
-            <a:lvl4pPr marL="1371600" indent="0">
-              <a:buNone/>
-              <a:defRPr sz="900"/>
-            </a:lvl4pPr>
-            <a:lvl5pPr marL="1828800" indent="0">
-              <a:buNone/>
-              <a:defRPr sz="900"/>
-            </a:lvl5pPr>
-            <a:lvl6pPr marL="2286000" indent="0">
-              <a:buNone/>
-              <a:defRPr sz="900"/>
-            </a:lvl6pPr>
-            <a:lvl7pPr marL="2743200" indent="0">
-              <a:buNone/>
-              <a:defRPr sz="900"/>
-            </a:lvl7pPr>
-            <a:lvl8pPr marL="3200400" indent="0">
-              <a:buNone/>
-              <a:defRPr sz="900"/>
-            </a:lvl8pPr>
-            <a:lvl9pPr marL="3657600" indent="0">
-              <a:buNone/>
-              <a:defRPr sz="900"/>
-            </a:lvl9pPr>
-          </a:lstStyle>
-          <a:p>
-            <a:pPr lvl="0"/>
-            <a:r>
-              <a:rPr lang="de-DE"/>
-              <a:t>Textmasterformate durch Klicken bearbeiten</a:t>
-            </a:r>
-          </a:p>
-        </p:txBody>
-      </p:sp>
-    </p:spTree>
-  </p:cSld>
-  <p:clrMapOvr>
-    <a:masterClrMapping/>
-  </p:clrMapOvr>
-</p:sldLayout>
-</file>
-
-<file path=ppt/slideLayouts/slideLayout9.xml><?xml version="1.0" encoding="utf-8"?>
+<file path=ppt/slideLayouts/slideLayout10.xml><?xml version="1.0" encoding="utf-8"?>
 <p:sldLayout xmlns:a="http://schemas.openxmlformats.org/drawingml/2006/main" xmlns:r="http://schemas.openxmlformats.org/officeDocument/2006/relationships" xmlns:p="http://schemas.openxmlformats.org/presentationml/2006/main" showMasterSp="0" preserve="1" userDrawn="1">
   <p:cSld name="1_Titelfolie">
     <p:spTree>
@@ -2942,7 +2050,7 @@
                 <a:tabLst/>
                 <a:defRPr/>
               </a:pPr>
-              <a:t>20.06.2017</a:t>
+              <a:t>05.07.2017</a:t>
             </a:fld>
             <a:r>
               <a:rPr kumimoji="0" lang="de-DE" sz="1000" b="0" i="0" u="none" strike="noStrike" kern="1200" cap="none" spc="0" normalizeH="0" baseline="0" noProof="0" dirty="0">
@@ -3201,6 +2309,1020 @@
 </p:sldLayout>
 </file>
 
+<file path=ppt/slideLayouts/slideLayout2.xml><?xml version="1.0" encoding="utf-8"?>
+<p:sldLayout xmlns:a="http://schemas.openxmlformats.org/drawingml/2006/main" xmlns:r="http://schemas.openxmlformats.org/officeDocument/2006/relationships" xmlns:p="http://schemas.openxmlformats.org/presentationml/2006/main" type="obj" preserve="1">
+  <p:cSld name="Titel und Inhalt">
+    <p:spTree>
+      <p:nvGrpSpPr>
+        <p:cNvPr id="1" name=""/>
+        <p:cNvGrpSpPr/>
+        <p:nvPr/>
+      </p:nvGrpSpPr>
+      <p:grpSpPr>
+        <a:xfrm>
+          <a:off x="0" y="0"/>
+          <a:ext cx="0" cy="0"/>
+          <a:chOff x="0" y="0"/>
+          <a:chExt cx="0" cy="0"/>
+        </a:xfrm>
+      </p:grpSpPr>
+      <p:sp>
+        <p:nvSpPr>
+          <p:cNvPr id="2" name="Titel 1"/>
+          <p:cNvSpPr>
+            <a:spLocks noGrp="1"/>
+          </p:cNvSpPr>
+          <p:nvPr>
+            <p:ph type="title"/>
+          </p:nvPr>
+        </p:nvSpPr>
+        <p:spPr/>
+        <p:txBody>
+          <a:bodyPr/>
+          <a:lstStyle/>
+          <a:p>
+            <a:r>
+              <a:rPr lang="de-DE"/>
+              <a:t>Titelmasterformat durch Klicken bearbeiten</a:t>
+            </a:r>
+          </a:p>
+        </p:txBody>
+      </p:sp>
+      <p:sp>
+        <p:nvSpPr>
+          <p:cNvPr id="3" name="Inhaltsplatzhalter 2"/>
+          <p:cNvSpPr>
+            <a:spLocks noGrp="1"/>
+          </p:cNvSpPr>
+          <p:nvPr>
+            <p:ph idx="1"/>
+          </p:nvPr>
+        </p:nvSpPr>
+        <p:spPr>
+          <a:xfrm>
+            <a:off x="360000" y="1620000"/>
+            <a:ext cx="6823569" cy="4479943"/>
+          </a:xfrm>
+        </p:spPr>
+        <p:txBody>
+          <a:bodyPr/>
+          <a:lstStyle/>
+          <a:p>
+            <a:pPr lvl="0"/>
+            <a:r>
+              <a:rPr lang="de-DE" dirty="0"/>
+              <a:t>Textmasterformate durch Klicken bearbeiten</a:t>
+            </a:r>
+          </a:p>
+          <a:p>
+            <a:pPr lvl="1"/>
+            <a:r>
+              <a:rPr lang="de-DE" dirty="0"/>
+              <a:t>Zweite Ebene</a:t>
+            </a:r>
+          </a:p>
+          <a:p>
+            <a:pPr lvl="2"/>
+            <a:r>
+              <a:rPr lang="de-DE" dirty="0"/>
+              <a:t>Dritte Ebene</a:t>
+            </a:r>
+          </a:p>
+          <a:p>
+            <a:pPr lvl="3"/>
+            <a:r>
+              <a:rPr lang="de-DE" dirty="0"/>
+              <a:t>Vierte Ebene</a:t>
+            </a:r>
+          </a:p>
+          <a:p>
+            <a:pPr lvl="4"/>
+            <a:r>
+              <a:rPr lang="de-DE" dirty="0"/>
+              <a:t>Fünfte Ebene</a:t>
+            </a:r>
+          </a:p>
+        </p:txBody>
+      </p:sp>
+    </p:spTree>
+  </p:cSld>
+  <p:clrMapOvr>
+    <a:masterClrMapping/>
+  </p:clrMapOvr>
+</p:sldLayout>
+</file>
+
+<file path=ppt/slideLayouts/slideLayout3.xml><?xml version="1.0" encoding="utf-8"?>
+<p:sldLayout xmlns:a="http://schemas.openxmlformats.org/drawingml/2006/main" xmlns:r="http://schemas.openxmlformats.org/officeDocument/2006/relationships" xmlns:p="http://schemas.openxmlformats.org/presentationml/2006/main" type="obj" preserve="1">
+  <p:cSld name="1_Titel und Inhalt">
+    <p:spTree>
+      <p:nvGrpSpPr>
+        <p:cNvPr id="1" name=""/>
+        <p:cNvGrpSpPr/>
+        <p:nvPr/>
+      </p:nvGrpSpPr>
+      <p:grpSpPr>
+        <a:xfrm>
+          <a:off x="0" y="0"/>
+          <a:ext cx="0" cy="0"/>
+          <a:chOff x="0" y="0"/>
+          <a:chExt cx="0" cy="0"/>
+        </a:xfrm>
+      </p:grpSpPr>
+      <p:sp>
+        <p:nvSpPr>
+          <p:cNvPr id="2" name="Titel 1"/>
+          <p:cNvSpPr>
+            <a:spLocks noGrp="1"/>
+          </p:cNvSpPr>
+          <p:nvPr>
+            <p:ph type="title"/>
+          </p:nvPr>
+        </p:nvSpPr>
+        <p:spPr/>
+        <p:txBody>
+          <a:bodyPr/>
+          <a:lstStyle/>
+          <a:p>
+            <a:r>
+              <a:rPr lang="de-DE"/>
+              <a:t>Titelmasterformat durch Klicken bearbeiten</a:t>
+            </a:r>
+          </a:p>
+        </p:txBody>
+      </p:sp>
+      <p:sp>
+        <p:nvSpPr>
+          <p:cNvPr id="3" name="Inhaltsplatzhalter 2"/>
+          <p:cNvSpPr>
+            <a:spLocks noGrp="1"/>
+          </p:cNvSpPr>
+          <p:nvPr>
+            <p:ph idx="1"/>
+          </p:nvPr>
+        </p:nvSpPr>
+        <p:spPr>
+          <a:xfrm>
+            <a:off x="360000" y="1620000"/>
+            <a:ext cx="6823569" cy="4479943"/>
+          </a:xfrm>
+        </p:spPr>
+        <p:txBody>
+          <a:bodyPr/>
+          <a:lstStyle>
+            <a:lvl1pPr marL="342900" indent="-342900">
+              <a:buClr>
+                <a:srgbClr val="005088"/>
+              </a:buClr>
+              <a:buFont typeface="Wingdings" panose="05000000000000000000" pitchFamily="2" charset="2"/>
+              <a:buChar char="§"/>
+              <a:defRPr i="0"/>
+            </a:lvl1pPr>
+          </a:lstStyle>
+          <a:p>
+            <a:pPr lvl="0"/>
+            <a:r>
+              <a:rPr lang="de-DE" dirty="0"/>
+              <a:t>Textmasterformate durch Klicken bearbeiten</a:t>
+            </a:r>
+          </a:p>
+          <a:p>
+            <a:pPr lvl="1"/>
+            <a:r>
+              <a:rPr lang="de-DE" dirty="0"/>
+              <a:t>Zweite Ebene</a:t>
+            </a:r>
+          </a:p>
+          <a:p>
+            <a:pPr lvl="2"/>
+            <a:r>
+              <a:rPr lang="de-DE" dirty="0"/>
+              <a:t>Dritte Ebene</a:t>
+            </a:r>
+          </a:p>
+          <a:p>
+            <a:pPr lvl="3"/>
+            <a:r>
+              <a:rPr lang="de-DE" dirty="0"/>
+              <a:t>Vierte Ebene</a:t>
+            </a:r>
+          </a:p>
+          <a:p>
+            <a:pPr lvl="4"/>
+            <a:r>
+              <a:rPr lang="de-DE" dirty="0"/>
+              <a:t>Fünfte Ebene</a:t>
+            </a:r>
+          </a:p>
+        </p:txBody>
+      </p:sp>
+    </p:spTree>
+    <p:extLst>
+      <p:ext uri="{BB962C8B-B14F-4D97-AF65-F5344CB8AC3E}">
+        <p14:creationId xmlns:p14="http://schemas.microsoft.com/office/powerpoint/2010/main" val="2968720719"/>
+      </p:ext>
+    </p:extLst>
+  </p:cSld>
+  <p:clrMapOvr>
+    <a:masterClrMapping/>
+  </p:clrMapOvr>
+</p:sldLayout>
+</file>
+
+<file path=ppt/slideLayouts/slideLayout4.xml><?xml version="1.0" encoding="utf-8"?>
+<p:sldLayout xmlns:a="http://schemas.openxmlformats.org/drawingml/2006/main" xmlns:r="http://schemas.openxmlformats.org/officeDocument/2006/relationships" xmlns:p="http://schemas.openxmlformats.org/presentationml/2006/main" type="secHead" preserve="1">
+  <p:cSld name="Abschnittsüberschrift">
+    <p:spTree>
+      <p:nvGrpSpPr>
+        <p:cNvPr id="1" name=""/>
+        <p:cNvGrpSpPr/>
+        <p:nvPr/>
+      </p:nvGrpSpPr>
+      <p:grpSpPr>
+        <a:xfrm>
+          <a:off x="0" y="0"/>
+          <a:ext cx="0" cy="0"/>
+          <a:chOff x="0" y="0"/>
+          <a:chExt cx="0" cy="0"/>
+        </a:xfrm>
+      </p:grpSpPr>
+      <p:sp>
+        <p:nvSpPr>
+          <p:cNvPr id="2" name="Titel 1"/>
+          <p:cNvSpPr>
+            <a:spLocks noGrp="1"/>
+          </p:cNvSpPr>
+          <p:nvPr>
+            <p:ph type="title"/>
+          </p:nvPr>
+        </p:nvSpPr>
+        <p:spPr>
+          <a:xfrm>
+            <a:off x="722313" y="4406900"/>
+            <a:ext cx="6421455" cy="1362075"/>
+          </a:xfrm>
+        </p:spPr>
+        <p:txBody>
+          <a:bodyPr anchor="t"/>
+          <a:lstStyle>
+            <a:lvl1pPr algn="l">
+              <a:defRPr sz="3200" b="1" cap="all"/>
+            </a:lvl1pPr>
+          </a:lstStyle>
+          <a:p>
+            <a:r>
+              <a:rPr lang="de-DE" dirty="0"/>
+              <a:t>Titelmasterformat durch Klicken bearbeiten</a:t>
+            </a:r>
+          </a:p>
+        </p:txBody>
+      </p:sp>
+      <p:sp>
+        <p:nvSpPr>
+          <p:cNvPr id="3" name="Textplatzhalter 2"/>
+          <p:cNvSpPr>
+            <a:spLocks noGrp="1"/>
+          </p:cNvSpPr>
+          <p:nvPr>
+            <p:ph type="body" idx="1"/>
+          </p:nvPr>
+        </p:nvSpPr>
+        <p:spPr>
+          <a:xfrm>
+            <a:off x="722313" y="2906713"/>
+            <a:ext cx="6421455" cy="1500187"/>
+          </a:xfrm>
+        </p:spPr>
+        <p:txBody>
+          <a:bodyPr anchor="b"/>
+          <a:lstStyle>
+            <a:lvl1pPr marL="0" indent="0">
+              <a:buNone/>
+              <a:defRPr sz="2000"/>
+            </a:lvl1pPr>
+            <a:lvl2pPr marL="457200" indent="0">
+              <a:buNone/>
+              <a:defRPr sz="1800"/>
+            </a:lvl2pPr>
+            <a:lvl3pPr marL="914400" indent="0">
+              <a:buNone/>
+              <a:defRPr sz="1600"/>
+            </a:lvl3pPr>
+            <a:lvl4pPr marL="1371600" indent="0">
+              <a:buNone/>
+              <a:defRPr sz="1400"/>
+            </a:lvl4pPr>
+            <a:lvl5pPr marL="1828800" indent="0">
+              <a:buNone/>
+              <a:defRPr sz="1400"/>
+            </a:lvl5pPr>
+            <a:lvl6pPr marL="2286000" indent="0">
+              <a:buNone/>
+              <a:defRPr sz="1400"/>
+            </a:lvl6pPr>
+            <a:lvl7pPr marL="2743200" indent="0">
+              <a:buNone/>
+              <a:defRPr sz="1400"/>
+            </a:lvl7pPr>
+            <a:lvl8pPr marL="3200400" indent="0">
+              <a:buNone/>
+              <a:defRPr sz="1400"/>
+            </a:lvl8pPr>
+            <a:lvl9pPr marL="3657600" indent="0">
+              <a:buNone/>
+              <a:defRPr sz="1400"/>
+            </a:lvl9pPr>
+          </a:lstStyle>
+          <a:p>
+            <a:pPr lvl="0"/>
+            <a:r>
+              <a:rPr lang="de-DE"/>
+              <a:t>Textmasterformate durch Klicken bearbeiten</a:t>
+            </a:r>
+          </a:p>
+        </p:txBody>
+      </p:sp>
+    </p:spTree>
+  </p:cSld>
+  <p:clrMapOvr>
+    <a:masterClrMapping/>
+  </p:clrMapOvr>
+</p:sldLayout>
+</file>
+
+<file path=ppt/slideLayouts/slideLayout5.xml><?xml version="1.0" encoding="utf-8"?>
+<p:sldLayout xmlns:a="http://schemas.openxmlformats.org/drawingml/2006/main" xmlns:r="http://schemas.openxmlformats.org/officeDocument/2006/relationships" xmlns:p="http://schemas.openxmlformats.org/presentationml/2006/main" type="twoObj" preserve="1">
+  <p:cSld name="Zwei Inhalte">
+    <p:spTree>
+      <p:nvGrpSpPr>
+        <p:cNvPr id="1" name=""/>
+        <p:cNvGrpSpPr/>
+        <p:nvPr/>
+      </p:nvGrpSpPr>
+      <p:grpSpPr>
+        <a:xfrm>
+          <a:off x="0" y="0"/>
+          <a:ext cx="0" cy="0"/>
+          <a:chOff x="0" y="0"/>
+          <a:chExt cx="0" cy="0"/>
+        </a:xfrm>
+      </p:grpSpPr>
+      <p:sp>
+        <p:nvSpPr>
+          <p:cNvPr id="2" name="Titel 1"/>
+          <p:cNvSpPr>
+            <a:spLocks noGrp="1"/>
+          </p:cNvSpPr>
+          <p:nvPr>
+            <p:ph type="title"/>
+          </p:nvPr>
+        </p:nvSpPr>
+        <p:spPr/>
+        <p:txBody>
+          <a:bodyPr/>
+          <a:lstStyle/>
+          <a:p>
+            <a:r>
+              <a:rPr lang="de-DE"/>
+              <a:t>Titelmasterformat durch Klicken bearbeiten</a:t>
+            </a:r>
+          </a:p>
+        </p:txBody>
+      </p:sp>
+      <p:sp>
+        <p:nvSpPr>
+          <p:cNvPr id="3" name="Inhaltsplatzhalter 2"/>
+          <p:cNvSpPr>
+            <a:spLocks noGrp="1"/>
+          </p:cNvSpPr>
+          <p:nvPr>
+            <p:ph sz="half" idx="1"/>
+          </p:nvPr>
+        </p:nvSpPr>
+        <p:spPr>
+          <a:xfrm>
+            <a:off x="358775" y="1592263"/>
+            <a:ext cx="4135438" cy="4551381"/>
+          </a:xfrm>
+        </p:spPr>
+        <p:txBody>
+          <a:bodyPr/>
+          <a:lstStyle>
+            <a:lvl1pPr marL="0" indent="0">
+              <a:defRPr sz="2000"/>
+            </a:lvl1pPr>
+            <a:lvl2pPr>
+              <a:defRPr sz="2000"/>
+            </a:lvl2pPr>
+            <a:lvl3pPr>
+              <a:defRPr sz="2000"/>
+            </a:lvl3pPr>
+            <a:lvl4pPr>
+              <a:defRPr sz="1800"/>
+            </a:lvl4pPr>
+            <a:lvl5pPr>
+              <a:defRPr sz="1800"/>
+            </a:lvl5pPr>
+            <a:lvl6pPr>
+              <a:defRPr sz="1800"/>
+            </a:lvl6pPr>
+            <a:lvl7pPr>
+              <a:defRPr sz="1800"/>
+            </a:lvl7pPr>
+            <a:lvl8pPr>
+              <a:defRPr sz="1800"/>
+            </a:lvl8pPr>
+            <a:lvl9pPr>
+              <a:defRPr sz="1800"/>
+            </a:lvl9pPr>
+          </a:lstStyle>
+          <a:p>
+            <a:pPr lvl="0"/>
+            <a:r>
+              <a:rPr lang="de-DE" dirty="0"/>
+              <a:t>Textmasterformate durch Klicken bearbeiten</a:t>
+            </a:r>
+          </a:p>
+          <a:p>
+            <a:pPr lvl="1"/>
+            <a:r>
+              <a:rPr lang="de-DE" dirty="0"/>
+              <a:t>Zweite Ebene</a:t>
+            </a:r>
+          </a:p>
+          <a:p>
+            <a:pPr lvl="2"/>
+            <a:r>
+              <a:rPr lang="de-DE" dirty="0"/>
+              <a:t>Dritte Ebene</a:t>
+            </a:r>
+          </a:p>
+          <a:p>
+            <a:pPr lvl="3"/>
+            <a:r>
+              <a:rPr lang="de-DE" dirty="0"/>
+              <a:t>Vierte Ebene</a:t>
+            </a:r>
+          </a:p>
+          <a:p>
+            <a:pPr lvl="4"/>
+            <a:r>
+              <a:rPr lang="de-DE" dirty="0"/>
+              <a:t>Fünfte Ebene</a:t>
+            </a:r>
+          </a:p>
+        </p:txBody>
+      </p:sp>
+      <p:sp>
+        <p:nvSpPr>
+          <p:cNvPr id="4" name="Inhaltsplatzhalter 3"/>
+          <p:cNvSpPr>
+            <a:spLocks noGrp="1"/>
+          </p:cNvSpPr>
+          <p:nvPr>
+            <p:ph sz="half" idx="2"/>
+          </p:nvPr>
+        </p:nvSpPr>
+        <p:spPr>
+          <a:xfrm>
+            <a:off x="4786314" y="1592263"/>
+            <a:ext cx="4105274" cy="4551381"/>
+          </a:xfrm>
+        </p:spPr>
+        <p:txBody>
+          <a:bodyPr/>
+          <a:lstStyle>
+            <a:lvl1pPr marL="0" indent="0">
+              <a:defRPr sz="2000"/>
+            </a:lvl1pPr>
+            <a:lvl2pPr>
+              <a:defRPr sz="2000"/>
+            </a:lvl2pPr>
+            <a:lvl3pPr>
+              <a:defRPr sz="2000"/>
+            </a:lvl3pPr>
+            <a:lvl4pPr>
+              <a:defRPr sz="1800"/>
+            </a:lvl4pPr>
+            <a:lvl5pPr>
+              <a:defRPr sz="1800"/>
+            </a:lvl5pPr>
+            <a:lvl6pPr>
+              <a:defRPr sz="1800"/>
+            </a:lvl6pPr>
+            <a:lvl7pPr>
+              <a:defRPr sz="1800"/>
+            </a:lvl7pPr>
+            <a:lvl8pPr>
+              <a:defRPr sz="1800"/>
+            </a:lvl8pPr>
+            <a:lvl9pPr>
+              <a:defRPr sz="1800"/>
+            </a:lvl9pPr>
+          </a:lstStyle>
+          <a:p>
+            <a:pPr lvl="0"/>
+            <a:r>
+              <a:rPr lang="de-DE" dirty="0"/>
+              <a:t>Textmasterformate durch Klicken bearbeiten</a:t>
+            </a:r>
+          </a:p>
+          <a:p>
+            <a:pPr lvl="1"/>
+            <a:r>
+              <a:rPr lang="de-DE" dirty="0"/>
+              <a:t>Zweite Ebene</a:t>
+            </a:r>
+          </a:p>
+          <a:p>
+            <a:pPr lvl="2"/>
+            <a:r>
+              <a:rPr lang="de-DE" dirty="0"/>
+              <a:t>Dritte Ebene</a:t>
+            </a:r>
+          </a:p>
+          <a:p>
+            <a:pPr lvl="3"/>
+            <a:r>
+              <a:rPr lang="de-DE" dirty="0"/>
+              <a:t>Vierte Ebene</a:t>
+            </a:r>
+          </a:p>
+          <a:p>
+            <a:pPr lvl="4"/>
+            <a:r>
+              <a:rPr lang="de-DE" dirty="0"/>
+              <a:t>Fünfte Ebene</a:t>
+            </a:r>
+          </a:p>
+        </p:txBody>
+      </p:sp>
+    </p:spTree>
+  </p:cSld>
+  <p:clrMapOvr>
+    <a:masterClrMapping/>
+  </p:clrMapOvr>
+</p:sldLayout>
+</file>
+
+<file path=ppt/slideLayouts/slideLayout6.xml><?xml version="1.0" encoding="utf-8"?>
+<p:sldLayout xmlns:a="http://schemas.openxmlformats.org/drawingml/2006/main" xmlns:r="http://schemas.openxmlformats.org/officeDocument/2006/relationships" xmlns:p="http://schemas.openxmlformats.org/presentationml/2006/main" type="titleOnly" preserve="1">
+  <p:cSld name="Nur Titel">
+    <p:spTree>
+      <p:nvGrpSpPr>
+        <p:cNvPr id="1" name=""/>
+        <p:cNvGrpSpPr/>
+        <p:nvPr/>
+      </p:nvGrpSpPr>
+      <p:grpSpPr>
+        <a:xfrm>
+          <a:off x="0" y="0"/>
+          <a:ext cx="0" cy="0"/>
+          <a:chOff x="0" y="0"/>
+          <a:chExt cx="0" cy="0"/>
+        </a:xfrm>
+      </p:grpSpPr>
+      <p:sp>
+        <p:nvSpPr>
+          <p:cNvPr id="2" name="Titel 1"/>
+          <p:cNvSpPr>
+            <a:spLocks noGrp="1"/>
+          </p:cNvSpPr>
+          <p:nvPr>
+            <p:ph type="title"/>
+          </p:nvPr>
+        </p:nvSpPr>
+        <p:spPr/>
+        <p:txBody>
+          <a:bodyPr/>
+          <a:lstStyle/>
+          <a:p>
+            <a:r>
+              <a:rPr lang="de-DE" dirty="0"/>
+              <a:t>Titelmasterformat durch Klicken bearbeiten</a:t>
+            </a:r>
+          </a:p>
+        </p:txBody>
+      </p:sp>
+    </p:spTree>
+  </p:cSld>
+  <p:clrMapOvr>
+    <a:masterClrMapping/>
+  </p:clrMapOvr>
+</p:sldLayout>
+</file>
+
+<file path=ppt/slideLayouts/slideLayout7.xml><?xml version="1.0" encoding="utf-8"?>
+<p:sldLayout xmlns:a="http://schemas.openxmlformats.org/drawingml/2006/main" xmlns:r="http://schemas.openxmlformats.org/officeDocument/2006/relationships" xmlns:p="http://schemas.openxmlformats.org/presentationml/2006/main" type="blank" preserve="1">
+  <p:cSld name="Leer">
+    <p:spTree>
+      <p:nvGrpSpPr>
+        <p:cNvPr id="1" name=""/>
+        <p:cNvGrpSpPr/>
+        <p:nvPr/>
+      </p:nvGrpSpPr>
+      <p:grpSpPr>
+        <a:xfrm>
+          <a:off x="0" y="0"/>
+          <a:ext cx="0" cy="0"/>
+          <a:chOff x="0" y="0"/>
+          <a:chExt cx="0" cy="0"/>
+        </a:xfrm>
+      </p:grpSpPr>
+    </p:spTree>
+  </p:cSld>
+  <p:clrMapOvr>
+    <a:masterClrMapping/>
+  </p:clrMapOvr>
+</p:sldLayout>
+</file>
+
+<file path=ppt/slideLayouts/slideLayout8.xml><?xml version="1.0" encoding="utf-8"?>
+<p:sldLayout xmlns:a="http://schemas.openxmlformats.org/drawingml/2006/main" xmlns:r="http://schemas.openxmlformats.org/officeDocument/2006/relationships" xmlns:p="http://schemas.openxmlformats.org/presentationml/2006/main" preserve="1" userDrawn="1">
+  <p:cSld name="Inhalt mit Überschrift">
+    <p:spTree>
+      <p:nvGrpSpPr>
+        <p:cNvPr id="1" name=""/>
+        <p:cNvGrpSpPr/>
+        <p:nvPr/>
+      </p:nvGrpSpPr>
+      <p:grpSpPr>
+        <a:xfrm>
+          <a:off x="0" y="0"/>
+          <a:ext cx="0" cy="0"/>
+          <a:chOff x="0" y="0"/>
+          <a:chExt cx="0" cy="0"/>
+        </a:xfrm>
+      </p:grpSpPr>
+      <p:sp>
+        <p:nvSpPr>
+          <p:cNvPr id="3" name="Inhaltsplatzhalter 2"/>
+          <p:cNvSpPr>
+            <a:spLocks noGrp="1"/>
+          </p:cNvSpPr>
+          <p:nvPr>
+            <p:ph idx="1"/>
+          </p:nvPr>
+        </p:nvSpPr>
+        <p:spPr>
+          <a:xfrm>
+            <a:off x="3857620" y="1620000"/>
+            <a:ext cx="5000660" cy="4506163"/>
+          </a:xfrm>
+        </p:spPr>
+        <p:txBody>
+          <a:bodyPr/>
+          <a:lstStyle>
+            <a:lvl1pPr>
+              <a:defRPr sz="2000"/>
+            </a:lvl1pPr>
+            <a:lvl2pPr>
+              <a:defRPr sz="2000"/>
+            </a:lvl2pPr>
+            <a:lvl3pPr>
+              <a:defRPr sz="1600"/>
+            </a:lvl3pPr>
+            <a:lvl4pPr>
+              <a:defRPr sz="1600"/>
+            </a:lvl4pPr>
+            <a:lvl5pPr>
+              <a:defRPr sz="1600"/>
+            </a:lvl5pPr>
+            <a:lvl6pPr>
+              <a:defRPr sz="2000"/>
+            </a:lvl6pPr>
+            <a:lvl7pPr>
+              <a:defRPr sz="2000"/>
+            </a:lvl7pPr>
+            <a:lvl8pPr>
+              <a:defRPr sz="2000"/>
+            </a:lvl8pPr>
+            <a:lvl9pPr>
+              <a:defRPr sz="2000"/>
+            </a:lvl9pPr>
+          </a:lstStyle>
+          <a:p>
+            <a:pPr lvl="0"/>
+            <a:r>
+              <a:rPr lang="de-DE" dirty="0"/>
+              <a:t>Textmasterformate durch Klicken bearbeiten</a:t>
+            </a:r>
+          </a:p>
+          <a:p>
+            <a:pPr lvl="1"/>
+            <a:r>
+              <a:rPr lang="de-DE" dirty="0"/>
+              <a:t>Zweite Ebene</a:t>
+            </a:r>
+          </a:p>
+          <a:p>
+            <a:pPr lvl="2"/>
+            <a:r>
+              <a:rPr lang="de-DE" dirty="0"/>
+              <a:t>Dritte Ebene</a:t>
+            </a:r>
+          </a:p>
+          <a:p>
+            <a:pPr lvl="3"/>
+            <a:r>
+              <a:rPr lang="de-DE" dirty="0"/>
+              <a:t>Vierte Ebene</a:t>
+            </a:r>
+          </a:p>
+          <a:p>
+            <a:pPr lvl="4"/>
+            <a:r>
+              <a:rPr lang="de-DE" dirty="0"/>
+              <a:t>Fünfte Ebene</a:t>
+            </a:r>
+          </a:p>
+        </p:txBody>
+      </p:sp>
+      <p:sp>
+        <p:nvSpPr>
+          <p:cNvPr id="4" name="Textplatzhalter 3"/>
+          <p:cNvSpPr>
+            <a:spLocks noGrp="1"/>
+          </p:cNvSpPr>
+          <p:nvPr>
+            <p:ph type="body" sz="half" idx="2"/>
+          </p:nvPr>
+        </p:nvSpPr>
+        <p:spPr>
+          <a:xfrm>
+            <a:off x="358776" y="1620000"/>
+            <a:ext cx="3106738" cy="4506163"/>
+          </a:xfrm>
+        </p:spPr>
+        <p:txBody>
+          <a:bodyPr/>
+          <a:lstStyle>
+            <a:lvl1pPr marL="0" indent="0">
+              <a:buNone/>
+              <a:defRPr sz="2000"/>
+            </a:lvl1pPr>
+            <a:lvl2pPr marL="457200" indent="0">
+              <a:buNone/>
+              <a:defRPr sz="1200"/>
+            </a:lvl2pPr>
+            <a:lvl3pPr marL="914400" indent="0">
+              <a:buNone/>
+              <a:defRPr sz="1000"/>
+            </a:lvl3pPr>
+            <a:lvl4pPr marL="1371600" indent="0">
+              <a:buNone/>
+              <a:defRPr sz="900"/>
+            </a:lvl4pPr>
+            <a:lvl5pPr marL="1828800" indent="0">
+              <a:buNone/>
+              <a:defRPr sz="900"/>
+            </a:lvl5pPr>
+            <a:lvl6pPr marL="2286000" indent="0">
+              <a:buNone/>
+              <a:defRPr sz="900"/>
+            </a:lvl6pPr>
+            <a:lvl7pPr marL="2743200" indent="0">
+              <a:buNone/>
+              <a:defRPr sz="900"/>
+            </a:lvl7pPr>
+            <a:lvl8pPr marL="3200400" indent="0">
+              <a:buNone/>
+              <a:defRPr sz="900"/>
+            </a:lvl8pPr>
+            <a:lvl9pPr marL="3657600" indent="0">
+              <a:buNone/>
+              <a:defRPr sz="900"/>
+            </a:lvl9pPr>
+          </a:lstStyle>
+          <a:p>
+            <a:pPr lvl="0"/>
+            <a:r>
+              <a:rPr lang="de-DE" dirty="0"/>
+              <a:t>Textmasterformate durch Klicken bearbeiten</a:t>
+            </a:r>
+          </a:p>
+        </p:txBody>
+      </p:sp>
+      <p:sp>
+        <p:nvSpPr>
+          <p:cNvPr id="5" name="Titel 1"/>
+          <p:cNvSpPr>
+            <a:spLocks noGrp="1"/>
+          </p:cNvSpPr>
+          <p:nvPr>
+            <p:ph type="title"/>
+          </p:nvPr>
+        </p:nvSpPr>
+        <p:spPr>
+          <a:xfrm>
+            <a:off x="358775" y="488950"/>
+            <a:ext cx="6840000" cy="838200"/>
+          </a:xfrm>
+        </p:spPr>
+        <p:txBody>
+          <a:bodyPr/>
+          <a:lstStyle/>
+          <a:p>
+            <a:r>
+              <a:rPr lang="de-DE"/>
+              <a:t>Titelmasterformat durch Klicken bearbeiten</a:t>
+            </a:r>
+          </a:p>
+        </p:txBody>
+      </p:sp>
+    </p:spTree>
+  </p:cSld>
+  <p:clrMapOvr>
+    <a:masterClrMapping/>
+  </p:clrMapOvr>
+</p:sldLayout>
+</file>
+
+<file path=ppt/slideLayouts/slideLayout9.xml><?xml version="1.0" encoding="utf-8"?>
+<p:sldLayout xmlns:a="http://schemas.openxmlformats.org/drawingml/2006/main" xmlns:r="http://schemas.openxmlformats.org/officeDocument/2006/relationships" xmlns:p="http://schemas.openxmlformats.org/presentationml/2006/main" type="picTx" preserve="1">
+  <p:cSld name="Bild mit Überschrift">
+    <p:spTree>
+      <p:nvGrpSpPr>
+        <p:cNvPr id="1" name=""/>
+        <p:cNvGrpSpPr/>
+        <p:nvPr/>
+      </p:nvGrpSpPr>
+      <p:grpSpPr>
+        <a:xfrm>
+          <a:off x="0" y="0"/>
+          <a:ext cx="0" cy="0"/>
+          <a:chOff x="0" y="0"/>
+          <a:chExt cx="0" cy="0"/>
+        </a:xfrm>
+      </p:grpSpPr>
+      <p:sp>
+        <p:nvSpPr>
+          <p:cNvPr id="2" name="Titel 1"/>
+          <p:cNvSpPr>
+            <a:spLocks noGrp="1"/>
+          </p:cNvSpPr>
+          <p:nvPr>
+            <p:ph type="title"/>
+          </p:nvPr>
+        </p:nvSpPr>
+        <p:spPr>
+          <a:xfrm>
+            <a:off x="1792288" y="4800600"/>
+            <a:ext cx="5486400" cy="566738"/>
+          </a:xfrm>
+        </p:spPr>
+        <p:txBody>
+          <a:bodyPr anchor="b"/>
+          <a:lstStyle>
+            <a:lvl1pPr algn="l">
+              <a:defRPr sz="2000" b="1"/>
+            </a:lvl1pPr>
+          </a:lstStyle>
+          <a:p>
+            <a:r>
+              <a:rPr lang="de-DE"/>
+              <a:t>Titelmasterformat durch Klicken bearbeiten</a:t>
+            </a:r>
+          </a:p>
+        </p:txBody>
+      </p:sp>
+      <p:sp>
+        <p:nvSpPr>
+          <p:cNvPr id="3" name="Bildplatzhalter 2"/>
+          <p:cNvSpPr>
+            <a:spLocks noGrp="1"/>
+          </p:cNvSpPr>
+          <p:nvPr>
+            <p:ph type="pic" idx="1"/>
+          </p:nvPr>
+        </p:nvSpPr>
+        <p:spPr>
+          <a:xfrm>
+            <a:off x="1792288" y="1928801"/>
+            <a:ext cx="5486400" cy="2798773"/>
+          </a:xfrm>
+        </p:spPr>
+        <p:txBody>
+          <a:bodyPr/>
+          <a:lstStyle>
+            <a:lvl1pPr marL="0" indent="0">
+              <a:buNone/>
+              <a:defRPr sz="3200"/>
+            </a:lvl1pPr>
+            <a:lvl2pPr marL="457200" indent="0">
+              <a:buNone/>
+              <a:defRPr sz="2800"/>
+            </a:lvl2pPr>
+            <a:lvl3pPr marL="914400" indent="0">
+              <a:buNone/>
+              <a:defRPr sz="2400"/>
+            </a:lvl3pPr>
+            <a:lvl4pPr marL="1371600" indent="0">
+              <a:buNone/>
+              <a:defRPr sz="2000"/>
+            </a:lvl4pPr>
+            <a:lvl5pPr marL="1828800" indent="0">
+              <a:buNone/>
+              <a:defRPr sz="2000"/>
+            </a:lvl5pPr>
+            <a:lvl6pPr marL="2286000" indent="0">
+              <a:buNone/>
+              <a:defRPr sz="2000"/>
+            </a:lvl6pPr>
+            <a:lvl7pPr marL="2743200" indent="0">
+              <a:buNone/>
+              <a:defRPr sz="2000"/>
+            </a:lvl7pPr>
+            <a:lvl8pPr marL="3200400" indent="0">
+              <a:buNone/>
+              <a:defRPr sz="2000"/>
+            </a:lvl8pPr>
+            <a:lvl9pPr marL="3657600" indent="0">
+              <a:buNone/>
+              <a:defRPr sz="2000"/>
+            </a:lvl9pPr>
+          </a:lstStyle>
+          <a:p>
+            <a:r>
+              <a:rPr lang="de-DE"/>
+              <a:t>Bild durch Klicken auf Symbol hinzufügen</a:t>
+            </a:r>
+          </a:p>
+        </p:txBody>
+      </p:sp>
+      <p:sp>
+        <p:nvSpPr>
+          <p:cNvPr id="4" name="Textplatzhalter 3"/>
+          <p:cNvSpPr>
+            <a:spLocks noGrp="1"/>
+          </p:cNvSpPr>
+          <p:nvPr>
+            <p:ph type="body" sz="half" idx="2"/>
+          </p:nvPr>
+        </p:nvSpPr>
+        <p:spPr>
+          <a:xfrm>
+            <a:off x="1792288" y="5367338"/>
+            <a:ext cx="5486400" cy="804862"/>
+          </a:xfrm>
+        </p:spPr>
+        <p:txBody>
+          <a:bodyPr/>
+          <a:lstStyle>
+            <a:lvl1pPr marL="0" indent="0">
+              <a:buNone/>
+              <a:defRPr sz="1400"/>
+            </a:lvl1pPr>
+            <a:lvl2pPr marL="457200" indent="0">
+              <a:buNone/>
+              <a:defRPr sz="1200"/>
+            </a:lvl2pPr>
+            <a:lvl3pPr marL="914400" indent="0">
+              <a:buNone/>
+              <a:defRPr sz="1000"/>
+            </a:lvl3pPr>
+            <a:lvl4pPr marL="1371600" indent="0">
+              <a:buNone/>
+              <a:defRPr sz="900"/>
+            </a:lvl4pPr>
+            <a:lvl5pPr marL="1828800" indent="0">
+              <a:buNone/>
+              <a:defRPr sz="900"/>
+            </a:lvl5pPr>
+            <a:lvl6pPr marL="2286000" indent="0">
+              <a:buNone/>
+              <a:defRPr sz="900"/>
+            </a:lvl6pPr>
+            <a:lvl7pPr marL="2743200" indent="0">
+              <a:buNone/>
+              <a:defRPr sz="900"/>
+            </a:lvl7pPr>
+            <a:lvl8pPr marL="3200400" indent="0">
+              <a:buNone/>
+              <a:defRPr sz="900"/>
+            </a:lvl8pPr>
+            <a:lvl9pPr marL="3657600" indent="0">
+              <a:buNone/>
+              <a:defRPr sz="900"/>
+            </a:lvl9pPr>
+          </a:lstStyle>
+          <a:p>
+            <a:pPr lvl="0"/>
+            <a:r>
+              <a:rPr lang="de-DE"/>
+              <a:t>Textmasterformate durch Klicken bearbeiten</a:t>
+            </a:r>
+          </a:p>
+        </p:txBody>
+      </p:sp>
+    </p:spTree>
+  </p:cSld>
+  <p:clrMapOvr>
+    <a:masterClrMapping/>
+  </p:clrMapOvr>
+</p:sldLayout>
+</file>
+
 <file path=ppt/slideMasters/slideMaster1.xml><?xml version="1.0" encoding="utf-8"?>
 <p:sldMaster xmlns:a="http://schemas.openxmlformats.org/drawingml/2006/main" xmlns:r="http://schemas.openxmlformats.org/officeDocument/2006/relationships" xmlns:p="http://schemas.openxmlformats.org/presentationml/2006/main" preserve="1">
   <p:cSld>
@@ -3422,7 +3544,7 @@
           <p:nvPr/>
         </p:nvPicPr>
         <p:blipFill>
-          <a:blip r:embed="rId11" cstate="print"/>
+          <a:blip r:embed="rId12" cstate="print"/>
           <a:srcRect r="5453"/>
           <a:stretch>
             <a:fillRect/>
@@ -3631,7 +3753,7 @@
                 <a:tabLst/>
                 <a:defRPr/>
               </a:pPr>
-              <a:t>20.06.2017</a:t>
+              <a:t>05.07.2017</a:t>
             </a:fld>
             <a:r>
               <a:rPr kumimoji="0" lang="de-DE" sz="1000" b="0" i="0" u="none" strike="noStrike" kern="1200" cap="none" spc="0" normalizeH="0" baseline="0" noProof="0" dirty="0">
@@ -3811,7 +3933,7 @@
           <p:nvPr userDrawn="1"/>
         </p:nvPicPr>
         <p:blipFill>
-          <a:blip r:embed="rId12">
+          <a:blip r:embed="rId13">
             <a:extLst>
               <a:ext uri="{28A0092B-C50C-407E-A947-70E740481C1C}">
                 <a14:useLocalDpi xmlns:a14="http://schemas.microsoft.com/office/drawing/2010/main" val="0"/>
@@ -3849,13 +3971,14 @@
   <p:sldLayoutIdLst>
     <p:sldLayoutId id="2147483649" r:id="rId1"/>
     <p:sldLayoutId id="2147483650" r:id="rId2"/>
-    <p:sldLayoutId id="2147483651" r:id="rId3"/>
-    <p:sldLayoutId id="2147483652" r:id="rId4"/>
-    <p:sldLayoutId id="2147483654" r:id="rId5"/>
-    <p:sldLayoutId id="2147483655" r:id="rId6"/>
-    <p:sldLayoutId id="2147483656" r:id="rId7"/>
-    <p:sldLayoutId id="2147483657" r:id="rId8"/>
-    <p:sldLayoutId id="2147483658" r:id="rId9"/>
+    <p:sldLayoutId id="2147483660" r:id="rId3"/>
+    <p:sldLayoutId id="2147483651" r:id="rId4"/>
+    <p:sldLayoutId id="2147483652" r:id="rId5"/>
+    <p:sldLayoutId id="2147483654" r:id="rId6"/>
+    <p:sldLayoutId id="2147483655" r:id="rId7"/>
+    <p:sldLayoutId id="2147483656" r:id="rId8"/>
+    <p:sldLayoutId id="2147483657" r:id="rId9"/>
+    <p:sldLayoutId id="2147483658" r:id="rId10"/>
   </p:sldLayoutIdLst>
   <p:hf hdr="0"/>
   <p:txStyles>
@@ -3990,7 +4113,7 @@
       </a:lvl9pPr>
     </p:titleStyle>
     <p:bodyStyle>
-      <a:lvl1pPr marL="179388" indent="-179388" algn="l" rtl="0" eaLnBrk="1" fontAlgn="base" hangingPunct="1">
+      <a:lvl1pPr marL="0" indent="0" algn="l" rtl="0" eaLnBrk="1" fontAlgn="base" hangingPunct="1">
         <a:lnSpc>
           <a:spcPct val="130000"/>
         </a:lnSpc>
@@ -4000,7 +4123,7 @@
         <a:spcAft>
           <a:spcPts val="230"/>
         </a:spcAft>
-        <a:buFont typeface="Wingdings" pitchFamily="2" charset="2"/>
+        <a:buFont typeface="Wingdings" panose="05000000000000000000" pitchFamily="2" charset="2"/>
         <a:buNone/>
         <a:defRPr sz="2000">
           <a:solidFill>
@@ -4021,6 +4144,9 @@
         <a:spcAft>
           <a:spcPts val="230"/>
         </a:spcAft>
+        <a:buClr>
+          <a:srgbClr val="005088"/>
+        </a:buClr>
         <a:buFont typeface="Wingdings" pitchFamily="2" charset="2"/>
         <a:buChar char="§"/>
         <a:defRPr sz="2000">
@@ -4041,6 +4167,9 @@
         <a:spcAft>
           <a:spcPts val="230"/>
         </a:spcAft>
+        <a:buClr>
+          <a:srgbClr val="005088"/>
+        </a:buClr>
         <a:buFont typeface="Wingdings" pitchFamily="2" charset="2"/>
         <a:buChar char="§"/>
         <a:defRPr>
@@ -4061,6 +4190,9 @@
         <a:spcAft>
           <a:spcPts val="230"/>
         </a:spcAft>
+        <a:buClr>
+          <a:srgbClr val="005088"/>
+        </a:buClr>
         <a:buFont typeface="Wingdings" pitchFamily="2" charset="2"/>
         <a:buChar char="§"/>
         <a:defRPr sz="1600">
@@ -4081,6 +4213,9 @@
         <a:spcAft>
           <a:spcPts val="230"/>
         </a:spcAft>
+        <a:buClr>
+          <a:srgbClr val="005088"/>
+        </a:buClr>
         <a:buFont typeface="Wingdings" pitchFamily="2" charset="2"/>
         <a:buChar char="§"/>
         <a:defRPr sz="1600">
@@ -4287,7 +4422,26 @@
           <a:bodyPr/>
           <a:lstStyle/>
           <a:p>
-            <a:endParaRPr lang="de-DE" dirty="0"/>
+            <a:r>
+              <a:rPr lang="de-DE" dirty="0"/>
+              <a:t>ADP: </a:t>
+            </a:r>
+            <a:r>
+              <a:rPr lang="de-DE" dirty="0" err="1"/>
+              <a:t>Keijo</a:t>
+            </a:r>
+            <a:r>
+              <a:rPr lang="de-DE" dirty="0"/>
+              <a:t> </a:t>
+            </a:r>
+            <a:r>
+              <a:rPr lang="de-DE" dirty="0" err="1"/>
+              <a:t>Buss</a:t>
+            </a:r>
+            <a:r>
+              <a:rPr lang="de-DE" dirty="0"/>
+              <a:t>, Dominik Henzel, Markus Degenhardt, Simon Lippert</a:t>
+            </a:r>
           </a:p>
         </p:txBody>
       </p:sp>
@@ -4308,32 +4462,204 @@
           <a:p>
             <a:r>
               <a:rPr lang="de-DE" dirty="0"/>
-              <a:t>Betreuertreffen </a:t>
+              <a:t>Sensitivität numerischer Vorhersagen des Wirkungsgrads von Hochdruckturbinen</a:t>
             </a:r>
-            <a:r>
-              <a:rPr lang="de-DE" dirty="0" smtClean="0"/>
-              <a:t>11.05.2017</a:t>
-            </a:r>
-            <a:endParaRPr lang="de-DE" dirty="0"/>
           </a:p>
         </p:txBody>
       </p:sp>
+      <p:pic>
+        <p:nvPicPr>
+          <p:cNvPr id="5" name="Grafik 4">
+            <a:extLst>
+              <a:ext uri="{FF2B5EF4-FFF2-40B4-BE49-F238E27FC236}">
+                <a16:creationId xmlns:a16="http://schemas.microsoft.com/office/drawing/2014/main" id="{E227F886-3FC4-4EC8-B699-37820BA7E278}"/>
+              </a:ext>
+            </a:extLst>
+          </p:cNvPr>
+          <p:cNvPicPr>
+            <a:picLocks noChangeAspect="1"/>
+          </p:cNvPicPr>
+          <p:nvPr/>
+        </p:nvPicPr>
+        <p:blipFill>
+          <a:blip r:embed="rId2" cstate="print">
+            <a:grayscl/>
+            <a:extLst>
+              <a:ext uri="{BEBA8EAE-BF5A-486C-A8C5-ECC9F3942E4B}">
+                <a14:imgProps xmlns:a14="http://schemas.microsoft.com/office/drawing/2010/main">
+                  <a14:imgLayer r:embed="rId3">
+                    <a14:imgEffect>
+                      <a14:colorTemperature colorTemp="8242"/>
+                    </a14:imgEffect>
+                  </a14:imgLayer>
+                </a14:imgProps>
+              </a:ext>
+              <a:ext uri="{28A0092B-C50C-407E-A947-70E740481C1C}">
+                <a14:useLocalDpi xmlns:a14="http://schemas.microsoft.com/office/drawing/2010/main" val="0"/>
+              </a:ext>
+            </a:extLst>
+          </a:blip>
+          <a:stretch>
+            <a:fillRect/>
+          </a:stretch>
+        </p:blipFill>
+        <p:spPr>
+          <a:xfrm>
+            <a:off x="1629927" y="2780928"/>
+            <a:ext cx="5884146" cy="3309832"/>
+          </a:xfrm>
+          <a:prstGeom prst="rect">
+            <a:avLst/>
+          </a:prstGeom>
+        </p:spPr>
+      </p:pic>
     </p:spTree>
   </p:cSld>
   <p:clrMapOvr>
     <a:masterClrMapping/>
   </p:clrMapOvr>
-  <p:timing>
-    <p:tnLst>
-      <p:par>
-        <p:cTn id="1" dur="indefinite" restart="never" nodeType="tmRoot"/>
-      </p:par>
-    </p:tnLst>
-  </p:timing>
 </p:sld>
 </file>
 
 <file path=ppt/slides/slide2.xml><?xml version="1.0" encoding="utf-8"?>
+<p:sld xmlns:a="http://schemas.openxmlformats.org/drawingml/2006/main" xmlns:r="http://schemas.openxmlformats.org/officeDocument/2006/relationships" xmlns:p="http://schemas.openxmlformats.org/presentationml/2006/main">
+  <p:cSld>
+    <p:spTree>
+      <p:nvGrpSpPr>
+        <p:cNvPr id="1" name=""/>
+        <p:cNvGrpSpPr/>
+        <p:nvPr/>
+      </p:nvGrpSpPr>
+      <p:grpSpPr>
+        <a:xfrm>
+          <a:off x="0" y="0"/>
+          <a:ext cx="0" cy="0"/>
+          <a:chOff x="0" y="0"/>
+          <a:chExt cx="0" cy="0"/>
+        </a:xfrm>
+      </p:grpSpPr>
+      <p:sp>
+        <p:nvSpPr>
+          <p:cNvPr id="2" name="Titel 1">
+            <a:extLst>
+              <a:ext uri="{FF2B5EF4-FFF2-40B4-BE49-F238E27FC236}">
+                <a16:creationId xmlns:a16="http://schemas.microsoft.com/office/drawing/2014/main" id="{D27A44A1-7D5C-4ED1-B1CC-16A1827DE5CE}"/>
+              </a:ext>
+            </a:extLst>
+          </p:cNvPr>
+          <p:cNvSpPr>
+            <a:spLocks noGrp="1"/>
+          </p:cNvSpPr>
+          <p:nvPr>
+            <p:ph type="title"/>
+          </p:nvPr>
+        </p:nvSpPr>
+        <p:spPr/>
+        <p:txBody>
+          <a:bodyPr/>
+          <a:lstStyle/>
+          <a:p>
+            <a:r>
+              <a:rPr lang="de-DE" dirty="0"/>
+              <a:t>Gliederung</a:t>
+            </a:r>
+          </a:p>
+        </p:txBody>
+      </p:sp>
+      <p:sp>
+        <p:nvSpPr>
+          <p:cNvPr id="3" name="Inhaltsplatzhalter 2">
+            <a:extLst>
+              <a:ext uri="{FF2B5EF4-FFF2-40B4-BE49-F238E27FC236}">
+                <a16:creationId xmlns:a16="http://schemas.microsoft.com/office/drawing/2014/main" id="{0A11E94A-080C-4F4A-B9ED-FC1B878B8CE0}"/>
+              </a:ext>
+            </a:extLst>
+          </p:cNvPr>
+          <p:cNvSpPr>
+            <a:spLocks noGrp="1"/>
+          </p:cNvSpPr>
+          <p:nvPr>
+            <p:ph idx="1"/>
+          </p:nvPr>
+        </p:nvSpPr>
+        <p:spPr/>
+        <p:txBody>
+          <a:bodyPr/>
+          <a:lstStyle/>
+          <a:p>
+            <a:r>
+              <a:rPr lang="de-DE" dirty="0"/>
+              <a:t>Grundlagen Turbomaschinen und Thermodynamik</a:t>
+            </a:r>
+          </a:p>
+          <a:p>
+            <a:pPr lvl="2"/>
+            <a:r>
+              <a:rPr lang="de-DE" dirty="0"/>
+              <a:t>Wirkungsgraddefinitionen</a:t>
+            </a:r>
+          </a:p>
+          <a:p>
+            <a:r>
+              <a:rPr lang="de-DE" dirty="0"/>
+              <a:t>Aachen-Turbine</a:t>
+            </a:r>
+          </a:p>
+          <a:p>
+            <a:pPr lvl="2"/>
+            <a:r>
+              <a:rPr lang="de-DE" dirty="0"/>
+              <a:t>Strukturiert</a:t>
+            </a:r>
+          </a:p>
+          <a:p>
+            <a:pPr lvl="2"/>
+            <a:r>
+              <a:rPr lang="de-DE" dirty="0"/>
+              <a:t>Unstrukturiert</a:t>
+            </a:r>
+          </a:p>
+          <a:p>
+            <a:pPr lvl="1"/>
+            <a:r>
+              <a:rPr lang="de-DE" dirty="0"/>
+              <a:t>Kanalströmung</a:t>
+            </a:r>
+          </a:p>
+          <a:p>
+            <a:pPr lvl="1"/>
+            <a:r>
+              <a:rPr lang="de-DE" dirty="0"/>
+              <a:t>Auswertungstool</a:t>
+            </a:r>
+          </a:p>
+          <a:p>
+            <a:pPr lvl="1"/>
+            <a:r>
+              <a:rPr lang="de-DE" dirty="0"/>
+              <a:t>Fazit</a:t>
+            </a:r>
+          </a:p>
+          <a:p>
+            <a:pPr lvl="1"/>
+            <a:endParaRPr lang="de-DE" dirty="0"/>
+          </a:p>
+        </p:txBody>
+      </p:sp>
+    </p:spTree>
+    <p:extLst>
+      <p:ext uri="{BB962C8B-B14F-4D97-AF65-F5344CB8AC3E}">
+        <p14:creationId xmlns:p14="http://schemas.microsoft.com/office/powerpoint/2010/main" val="305700967"/>
+      </p:ext>
+    </p:extLst>
+  </p:cSld>
+  <p:clrMapOvr>
+    <a:masterClrMapping/>
+  </p:clrMapOvr>
+</p:sld>
+</file>
+
+<file path=ppt/slides/slide3.xml><?xml version="1.0" encoding="utf-8"?>
 <p:sld xmlns:a="http://schemas.openxmlformats.org/drawingml/2006/main" xmlns:r="http://schemas.openxmlformats.org/officeDocument/2006/relationships" xmlns:p="http://schemas.openxmlformats.org/presentationml/2006/main">
   <p:cSld>
     <p:spTree>
@@ -4366,10 +4692,9 @@
           <a:lstStyle/>
           <a:p>
             <a:r>
-              <a:rPr lang="de-DE" dirty="0" smtClean="0"/>
+              <a:rPr lang="de-DE" dirty="0"/>
               <a:t>Kanalströmung</a:t>
             </a:r>
-            <a:endParaRPr lang="de-DE" dirty="0"/>
           </a:p>
         </p:txBody>
       </p:sp>
@@ -4389,13 +4714,13 @@
           <a:lstStyle/>
           <a:p>
             <a:r>
-              <a:rPr lang="de-DE" dirty="0" smtClean="0"/>
+              <a:rPr lang="de-DE" dirty="0"/>
               <a:t>Außendurchmesser: 50mm</a:t>
             </a:r>
           </a:p>
           <a:p>
             <a:r>
-              <a:rPr lang="de-DE" dirty="0" smtClean="0"/>
+              <a:rPr lang="de-DE" dirty="0"/>
               <a:t>Innendurchmesser: 25mm</a:t>
             </a:r>
           </a:p>
@@ -4404,29 +4729,29 @@
           </a:p>
           <a:p>
             <a:r>
-              <a:rPr lang="de-DE" u="sng" dirty="0" smtClean="0"/>
+              <a:rPr lang="de-DE" u="sng" dirty="0"/>
               <a:t>Neu:</a:t>
             </a:r>
           </a:p>
           <a:p>
             <a:r>
-              <a:rPr lang="de-DE" dirty="0" smtClean="0"/>
+              <a:rPr lang="de-DE" dirty="0"/>
               <a:t>Außendurchmesser: 300mm</a:t>
             </a:r>
           </a:p>
           <a:p>
             <a:r>
-              <a:rPr lang="de-DE" dirty="0" smtClean="0"/>
+              <a:rPr lang="de-DE" dirty="0"/>
               <a:t>Innendurchmesser: 240mm</a:t>
             </a:r>
           </a:p>
           <a:p>
             <a:r>
-              <a:rPr lang="de-DE" dirty="0" smtClean="0"/>
+              <a:rPr lang="de-DE" dirty="0"/>
               <a:t>Länge: 160mm </a:t>
             </a:r>
             <a:r>
-              <a:rPr lang="de-DE" smtClean="0"/>
+              <a:rPr lang="de-DE"/>
               <a:t>(80mm/Domain)</a:t>
             </a:r>
             <a:endParaRPr lang="de-DE" dirty="0"/>
@@ -4536,17 +4861,10 @@
   <p:clrMapOvr>
     <a:masterClrMapping/>
   </p:clrMapOvr>
-  <p:timing>
-    <p:tnLst>
-      <p:par>
-        <p:cTn id="1" dur="indefinite" restart="never" nodeType="tmRoot"/>
-      </p:par>
-    </p:tnLst>
-  </p:timing>
 </p:sld>
 </file>
 
-<file path=ppt/slides/slide3.xml><?xml version="1.0" encoding="utf-8"?>
+<file path=ppt/slides/slide4.xml><?xml version="1.0" encoding="utf-8"?>
 <p:sld xmlns:a="http://schemas.openxmlformats.org/drawingml/2006/main" xmlns:r="http://schemas.openxmlformats.org/officeDocument/2006/relationships" xmlns:p="http://schemas.openxmlformats.org/presentationml/2006/main">
   <p:cSld>
     <p:spTree>
@@ -4579,10 +4897,9 @@
           <a:lstStyle/>
           <a:p>
             <a:r>
-              <a:rPr lang="de-DE" dirty="0" smtClean="0"/>
+              <a:rPr lang="de-DE" dirty="0"/>
               <a:t>Auswertung</a:t>
             </a:r>
-            <a:endParaRPr lang="de-DE" dirty="0"/>
           </a:p>
         </p:txBody>
       </p:sp>
@@ -4614,11 +4931,41 @@
                     <a:tableStyleId>{21E4AEA4-8DFA-4A89-87EB-49C32662AFE0}</a:tableStyleId>
                   </a:tblPr>
                   <a:tblGrid>
-                    <a:gridCol w="1682253"/>
-                    <a:gridCol w="1682253"/>
-                    <a:gridCol w="1682253"/>
-                    <a:gridCol w="1682253"/>
-                    <a:gridCol w="1682253"/>
+                    <a:gridCol w="1682253">
+                      <a:extLst>
+                        <a:ext uri="{9D8B030D-6E8A-4147-A177-3AD203B41FA5}">
+                          <a16:colId xmlns:a16="http://schemas.microsoft.com/office/drawing/2014/main" val="20000"/>
+                        </a:ext>
+                      </a:extLst>
+                    </a:gridCol>
+                    <a:gridCol w="1682253">
+                      <a:extLst>
+                        <a:ext uri="{9D8B030D-6E8A-4147-A177-3AD203B41FA5}">
+                          <a16:colId xmlns:a16="http://schemas.microsoft.com/office/drawing/2014/main" val="20001"/>
+                        </a:ext>
+                      </a:extLst>
+                    </a:gridCol>
+                    <a:gridCol w="1682253">
+                      <a:extLst>
+                        <a:ext uri="{9D8B030D-6E8A-4147-A177-3AD203B41FA5}">
+                          <a16:colId xmlns:a16="http://schemas.microsoft.com/office/drawing/2014/main" val="20002"/>
+                        </a:ext>
+                      </a:extLst>
+                    </a:gridCol>
+                    <a:gridCol w="1682253">
+                      <a:extLst>
+                        <a:ext uri="{9D8B030D-6E8A-4147-A177-3AD203B41FA5}">
+                          <a16:colId xmlns:a16="http://schemas.microsoft.com/office/drawing/2014/main" val="20003"/>
+                        </a:ext>
+                      </a:extLst>
+                    </a:gridCol>
+                    <a:gridCol w="1682253">
+                      <a:extLst>
+                        <a:ext uri="{9D8B030D-6E8A-4147-A177-3AD203B41FA5}">
+                          <a16:colId xmlns:a16="http://schemas.microsoft.com/office/drawing/2014/main" val="20004"/>
+                        </a:ext>
+                      </a:extLst>
+                    </a:gridCol>
                   </a:tblGrid>
                   <a:tr h="841554">
                     <a:tc>
@@ -4641,10 +4988,9 @@
                         <a:lstStyle/>
                         <a:p>
                           <a:r>
-                            <a:rPr lang="de-DE" sz="1600" dirty="0" smtClean="0"/>
+                            <a:rPr lang="de-DE" sz="1600" dirty="0"/>
                             <a:t>Referenz - Stationär</a:t>
                           </a:r>
-                          <a:endParaRPr lang="de-DE" sz="1600" dirty="0"/>
                         </a:p>
                       </a:txBody>
                       <a:tcPr anchor="ctr">
@@ -4659,10 +5005,9 @@
                         <a:lstStyle/>
                         <a:p>
                           <a:r>
-                            <a:rPr lang="de-DE" sz="1600" dirty="0" smtClean="0"/>
+                            <a:rPr lang="de-DE" sz="1600" dirty="0"/>
                             <a:t>Rotor feiner - Stationär</a:t>
                           </a:r>
-                          <a:endParaRPr lang="de-DE" sz="1600" dirty="0"/>
                         </a:p>
                       </a:txBody>
                       <a:tcPr anchor="ctr">
@@ -4677,14 +5022,13 @@
                         <a:lstStyle/>
                         <a:p>
                           <a:r>
-                            <a:rPr lang="de-DE" sz="1600" dirty="0" err="1" smtClean="0"/>
+                            <a:rPr lang="de-DE" sz="1600" dirty="0" err="1"/>
                             <a:t>Instationär</a:t>
                           </a:r>
                           <a:r>
-                            <a:rPr lang="de-DE" sz="1600" dirty="0" smtClean="0"/>
+                            <a:rPr lang="de-DE" sz="1600" dirty="0"/>
                             <a:t> (Mixing-Plane)</a:t>
                           </a:r>
-                          <a:endParaRPr lang="de-DE" sz="1600" dirty="0"/>
                         </a:p>
                       </a:txBody>
                       <a:tcPr anchor="ctr">
@@ -4699,11 +5043,11 @@
                         <a:lstStyle/>
                         <a:p>
                           <a:r>
-                            <a:rPr lang="de-DE" sz="1600" dirty="0" err="1" smtClean="0"/>
+                            <a:rPr lang="de-DE" sz="1600" dirty="0" err="1"/>
                             <a:t>Instationär</a:t>
                           </a:r>
                           <a:r>
-                            <a:rPr lang="de-DE" sz="1600" baseline="0" dirty="0" smtClean="0"/>
+                            <a:rPr lang="de-DE" sz="1600" baseline="0" dirty="0"/>
                             <a:t> (Transient Rotor Stator)</a:t>
                           </a:r>
                           <a:endParaRPr lang="de-DE" sz="1600" dirty="0"/>
@@ -4715,6 +5059,11 @@
                         </a:solidFill>
                       </a:tcPr>
                     </a:tc>
+                    <a:extLst>
+                      <a:ext uri="{0D108BD9-81ED-4DB2-BD59-A6C34878D82A}">
+                        <a16:rowId xmlns:a16="http://schemas.microsoft.com/office/drawing/2014/main" val="10000"/>
+                      </a:ext>
+                    </a:extLst>
                   </a:tr>
                   <a:tr h="487567">
                     <a:tc>
@@ -5042,6 +5391,11 @@
                       </a:txBody>
                       <a:tcPr anchor="ctr"/>
                     </a:tc>
+                    <a:extLst>
+                      <a:ext uri="{0D108BD9-81ED-4DB2-BD59-A6C34878D82A}">
+                        <a16:rowId xmlns:a16="http://schemas.microsoft.com/office/drawing/2014/main" val="10001"/>
+                      </a:ext>
+                    </a:extLst>
                   </a:tr>
                   <a:tr h="487567">
                     <a:tc>
@@ -5379,6 +5733,11 @@
                       </a:txBody>
                       <a:tcPr anchor="ctr"/>
                     </a:tc>
+                    <a:extLst>
+                      <a:ext uri="{0D108BD9-81ED-4DB2-BD59-A6C34878D82A}">
+                        <a16:rowId xmlns:a16="http://schemas.microsoft.com/office/drawing/2014/main" val="10002"/>
+                      </a:ext>
+                    </a:extLst>
                   </a:tr>
                   <a:tr h="487567">
                     <a:tc>
@@ -5725,6 +6084,11 @@
                       </a:txBody>
                       <a:tcPr anchor="ctr"/>
                     </a:tc>
+                    <a:extLst>
+                      <a:ext uri="{0D108BD9-81ED-4DB2-BD59-A6C34878D82A}">
+                        <a16:rowId xmlns:a16="http://schemas.microsoft.com/office/drawing/2014/main" val="10003"/>
+                      </a:ext>
+                    </a:extLst>
                   </a:tr>
                 </a:tbl>
               </a:graphicData>
@@ -6152,7 +6516,7 @@
               <a:lstStyle/>
               <a:p>
                 <a:r>
-                  <a:rPr lang="de-DE" dirty="0" smtClean="0"/>
+                  <a:rPr lang="de-DE" dirty="0"/>
                   <a:t>Inlet:   </a:t>
                 </a:r>
                 <a14:m>
@@ -6202,11 +6566,11 @@
                     </m:r>
                   </m:oMath>
                 </a14:m>
-                <a:endParaRPr lang="de-DE" b="0" dirty="0" smtClean="0"/>
+                <a:endParaRPr lang="de-DE" b="0" dirty="0"/>
               </a:p>
               <a:p>
                 <a:r>
-                  <a:rPr lang="de-DE" dirty="0" smtClean="0"/>
+                  <a:rPr lang="de-DE" dirty="0"/>
                   <a:t>           </a:t>
                 </a:r>
                 <a14:m>
@@ -6250,11 +6614,11 @@
                     </m:r>
                   </m:oMath>
                 </a14:m>
-                <a:endParaRPr lang="de-DE" dirty="0" smtClean="0"/>
+                <a:endParaRPr lang="de-DE" dirty="0"/>
               </a:p>
               <a:p>
                 <a:r>
-                  <a:rPr lang="de-DE" dirty="0" smtClean="0"/>
+                  <a:rPr lang="de-DE" dirty="0"/>
                   <a:t>Outlet: </a:t>
                 </a:r>
                 <a14:m>
@@ -6377,10 +6741,9 @@
           <a:lstStyle/>
           <a:p>
             <a:r>
-              <a:rPr lang="de-DE" dirty="0" smtClean="0"/>
+              <a:rPr lang="de-DE" dirty="0"/>
               <a:t>Bilanzierung über Stator-Rotor Interface</a:t>
             </a:r>
-            <a:endParaRPr lang="de-DE" dirty="0"/>
           </a:p>
         </p:txBody>
       </p:sp>
@@ -6394,17 +6757,10 @@
   <p:clrMapOvr>
     <a:masterClrMapping/>
   </p:clrMapOvr>
-  <p:timing>
-    <p:tnLst>
-      <p:par>
-        <p:cTn id="1" dur="indefinite" restart="never" nodeType="tmRoot"/>
-      </p:par>
-    </p:tnLst>
-  </p:timing>
 </p:sld>
 </file>
 
-<file path=ppt/slides/slide4.xml><?xml version="1.0" encoding="utf-8"?>
+<file path=ppt/slides/slide5.xml><?xml version="1.0" encoding="utf-8"?>
 <p:sld xmlns:a="http://schemas.openxmlformats.org/drawingml/2006/main" xmlns:r="http://schemas.openxmlformats.org/officeDocument/2006/relationships" xmlns:p="http://schemas.openxmlformats.org/presentationml/2006/main">
   <p:cSld>
     <p:spTree>
@@ -6437,10 +6793,9 @@
           <a:lstStyle/>
           <a:p>
             <a:r>
-              <a:rPr lang="de-DE" dirty="0" smtClean="0"/>
+              <a:rPr lang="de-DE" dirty="0"/>
               <a:t>Betriebspunkt-Veränderung</a:t>
             </a:r>
-            <a:endParaRPr lang="de-DE" dirty="0"/>
           </a:p>
         </p:txBody>
       </p:sp>
@@ -6469,15 +6824,15 @@
               <a:lstStyle/>
               <a:p>
                 <a:r>
-                  <a:rPr lang="de-DE" dirty="0" smtClean="0"/>
+                  <a:rPr lang="de-DE" dirty="0"/>
                   <a:t>(1) </a:t>
                 </a:r>
                 <a:r>
-                  <a:rPr lang="de-DE" dirty="0" err="1" smtClean="0"/>
+                  <a:rPr lang="de-DE" dirty="0" err="1"/>
                   <a:t>Inlet</a:t>
                 </a:r>
                 <a:r>
-                  <a:rPr lang="de-DE" dirty="0" smtClean="0"/>
+                  <a:rPr lang="de-DE" dirty="0"/>
                   <a:t>:	 </a:t>
                 </a:r>
                 <a14:m>
@@ -6527,11 +6882,11 @@
                     </m:r>
                   </m:oMath>
                 </a14:m>
-                <a:endParaRPr lang="de-DE" b="0" dirty="0" smtClean="0"/>
+                <a:endParaRPr lang="de-DE" b="0" dirty="0"/>
               </a:p>
               <a:p>
                 <a:r>
-                  <a:rPr lang="de-DE" dirty="0" smtClean="0"/>
+                  <a:rPr lang="de-DE" dirty="0"/>
                   <a:t>       	  </a:t>
                 </a:r>
                 <a14:m>
@@ -6575,16 +6930,12 @@
                     </m:r>
                   </m:oMath>
                 </a14:m>
-                <a:endParaRPr lang="de-DE" dirty="0" smtClean="0"/>
+                <a:endParaRPr lang="de-DE" dirty="0"/>
               </a:p>
               <a:p>
                 <a:r>
                   <a:rPr lang="de-DE" dirty="0"/>
-                  <a:t> </a:t>
-                </a:r>
-                <a:r>
-                  <a:rPr lang="de-DE" dirty="0" smtClean="0"/>
-                  <a:t>    Outlet: </a:t>
+                  <a:t>     Outlet: </a:t>
                 </a:r>
                 <a14:m>
                   <m:oMath xmlns:m="http://schemas.openxmlformats.org/officeDocument/2006/math">
@@ -6708,15 +7059,15 @@
               <a:lstStyle/>
               <a:p>
                 <a:r>
-                  <a:rPr lang="de-DE" dirty="0" smtClean="0"/>
+                  <a:rPr lang="de-DE" dirty="0"/>
                   <a:t>(2) </a:t>
                 </a:r>
                 <a:r>
-                  <a:rPr lang="de-DE" dirty="0" err="1" smtClean="0"/>
+                  <a:rPr lang="de-DE" dirty="0" err="1"/>
                   <a:t>Inlet</a:t>
                 </a:r>
                 <a:r>
-                  <a:rPr lang="de-DE" dirty="0" smtClean="0"/>
+                  <a:rPr lang="de-DE" dirty="0"/>
                   <a:t>:   </a:t>
                 </a:r>
                 <a14:m>
@@ -6760,11 +7111,11 @@
                     </m:r>
                   </m:oMath>
                 </a14:m>
-                <a:endParaRPr lang="de-DE" b="0" dirty="0" smtClean="0"/>
+                <a:endParaRPr lang="de-DE" b="0" dirty="0"/>
               </a:p>
               <a:p>
                 <a:r>
-                  <a:rPr lang="de-DE" dirty="0" smtClean="0"/>
+                  <a:rPr lang="de-DE" dirty="0"/>
                   <a:t>           	 </a:t>
                 </a:r>
                 <a14:m>
@@ -6814,11 +7165,11 @@
                     </m:r>
                   </m:oMath>
                 </a14:m>
-                <a:endParaRPr lang="de-DE" dirty="0" smtClean="0"/>
+                <a:endParaRPr lang="de-DE" dirty="0"/>
               </a:p>
               <a:p>
                 <a:r>
-                  <a:rPr lang="de-DE" dirty="0" smtClean="0"/>
+                  <a:rPr lang="de-DE" dirty="0"/>
                   <a:t>     Outlet: </a:t>
                 </a:r>
                 <a14:m>
@@ -6946,9 +7297,27 @@
                     <a:tableStyleId>{21E4AEA4-8DFA-4A89-87EB-49C32662AFE0}</a:tableStyleId>
                   </a:tblPr>
                   <a:tblGrid>
-                    <a:gridCol w="1682253"/>
-                    <a:gridCol w="1682253"/>
-                    <a:gridCol w="1682253"/>
+                    <a:gridCol w="1682253">
+                      <a:extLst>
+                        <a:ext uri="{9D8B030D-6E8A-4147-A177-3AD203B41FA5}">
+                          <a16:colId xmlns:a16="http://schemas.microsoft.com/office/drawing/2014/main" val="20000"/>
+                        </a:ext>
+                      </a:extLst>
+                    </a:gridCol>
+                    <a:gridCol w="1682253">
+                      <a:extLst>
+                        <a:ext uri="{9D8B030D-6E8A-4147-A177-3AD203B41FA5}">
+                          <a16:colId xmlns:a16="http://schemas.microsoft.com/office/drawing/2014/main" val="20001"/>
+                        </a:ext>
+                      </a:extLst>
+                    </a:gridCol>
+                    <a:gridCol w="1682253">
+                      <a:extLst>
+                        <a:ext uri="{9D8B030D-6E8A-4147-A177-3AD203B41FA5}">
+                          <a16:colId xmlns:a16="http://schemas.microsoft.com/office/drawing/2014/main" val="20002"/>
+                        </a:ext>
+                      </a:extLst>
+                    </a:gridCol>
                   </a:tblGrid>
                   <a:tr h="853601">
                     <a:tc>
@@ -6973,10 +7342,9 @@
                         <a:p>
                           <a:pPr algn="ctr"/>
                           <a:r>
-                            <a:rPr lang="de-DE" sz="2000" dirty="0" smtClean="0"/>
+                            <a:rPr lang="de-DE" sz="2000" dirty="0"/>
                             <a:t>(1)</a:t>
                           </a:r>
-                          <a:endParaRPr lang="de-DE" sz="2000" dirty="0"/>
                         </a:p>
                       </a:txBody>
                       <a:tcPr anchor="ctr">
@@ -6992,10 +7360,9 @@
                         <a:p>
                           <a:pPr algn="ctr"/>
                           <a:r>
-                            <a:rPr lang="de-DE" sz="2000" dirty="0" smtClean="0"/>
+                            <a:rPr lang="de-DE" sz="2000" dirty="0"/>
                             <a:t>(2)</a:t>
                           </a:r>
-                          <a:endParaRPr lang="de-DE" sz="2000" dirty="0"/>
                         </a:p>
                       </a:txBody>
                       <a:tcPr anchor="ctr">
@@ -7004,6 +7371,11 @@
                         </a:solidFill>
                       </a:tcPr>
                     </a:tc>
+                    <a:extLst>
+                      <a:ext uri="{0D108BD9-81ED-4DB2-BD59-A6C34878D82A}">
+                        <a16:rowId xmlns:a16="http://schemas.microsoft.com/office/drawing/2014/main" val="10000"/>
+                      </a:ext>
+                    </a:extLst>
                   </a:tr>
                   <a:tr h="487567">
                     <a:tc>
@@ -7197,6 +7569,11 @@
                       </a:txBody>
                       <a:tcPr anchor="ctr"/>
                     </a:tc>
+                    <a:extLst>
+                      <a:ext uri="{0D108BD9-81ED-4DB2-BD59-A6C34878D82A}">
+                        <a16:rowId xmlns:a16="http://schemas.microsoft.com/office/drawing/2014/main" val="10001"/>
+                      </a:ext>
+                    </a:extLst>
                   </a:tr>
                   <a:tr h="487567">
                     <a:tc>
@@ -7405,6 +7782,11 @@
                       </a:txBody>
                       <a:tcPr anchor="ctr"/>
                     </a:tc>
+                    <a:extLst>
+                      <a:ext uri="{0D108BD9-81ED-4DB2-BD59-A6C34878D82A}">
+                        <a16:rowId xmlns:a16="http://schemas.microsoft.com/office/drawing/2014/main" val="10002"/>
+                      </a:ext>
+                    </a:extLst>
                   </a:tr>
                   <a:tr h="487567">
                     <a:tc>
@@ -7627,6 +8009,11 @@
                       </a:txBody>
                       <a:tcPr anchor="ctr"/>
                     </a:tc>
+                    <a:extLst>
+                      <a:ext uri="{0D108BD9-81ED-4DB2-BD59-A6C34878D82A}">
+                        <a16:rowId xmlns:a16="http://schemas.microsoft.com/office/drawing/2014/main" val="10003"/>
+                      </a:ext>
+                    </a:extLst>
                   </a:tr>
                 </a:tbl>
               </a:graphicData>
@@ -7894,17 +8281,10 @@
   <p:clrMapOvr>
     <a:masterClrMapping/>
   </p:clrMapOvr>
-  <p:timing>
-    <p:tnLst>
-      <p:par>
-        <p:cTn id="1" dur="indefinite" restart="never" nodeType="tmRoot"/>
-      </p:par>
-    </p:tnLst>
-  </p:timing>
 </p:sld>
 </file>
 
-<file path=ppt/slides/slide5.xml><?xml version="1.0" encoding="utf-8"?>
+<file path=ppt/slides/slide6.xml><?xml version="1.0" encoding="utf-8"?>
 <p:sld xmlns:a="http://schemas.openxmlformats.org/drawingml/2006/main" xmlns:r="http://schemas.openxmlformats.org/officeDocument/2006/relationships" xmlns:p="http://schemas.openxmlformats.org/presentationml/2006/main">
   <p:cSld>
     <p:spTree>
@@ -7988,11 +8368,11 @@
             <a:lstStyle/>
             <a:p>
               <a:r>
-                <a:rPr lang="de-DE" dirty="0" smtClean="0"/>
+                <a:rPr lang="de-DE" dirty="0"/>
                 <a:t>Mit </a:t>
               </a:r>
               <a:r>
-                <a:rPr lang="de-DE" dirty="0" err="1" smtClean="0"/>
+                <a:rPr lang="de-DE" dirty="0" err="1"/>
                 <a:t>Fillet</a:t>
               </a:r>
               <a:endParaRPr lang="de-DE" dirty="0"/>
@@ -8022,11 +8402,11 @@
             <a:lstStyle/>
             <a:p>
               <a:r>
-                <a:rPr lang="de-DE" dirty="0" smtClean="0"/>
+                <a:rPr lang="de-DE" dirty="0"/>
                 <a:t>Ohne </a:t>
               </a:r>
               <a:r>
-                <a:rPr lang="de-DE" dirty="0" err="1" smtClean="0"/>
+                <a:rPr lang="de-DE" dirty="0" err="1"/>
                 <a:t>Fillet</a:t>
               </a:r>
               <a:endParaRPr lang="de-DE" dirty="0"/>
@@ -8047,7 +8427,7 @@
 </p:sld>
 </file>
 
-<file path=ppt/slides/slide6.xml><?xml version="1.0" encoding="utf-8"?>
+<file path=ppt/slides/slide7.xml><?xml version="1.0" encoding="utf-8"?>
 <p:sld xmlns:a="http://schemas.openxmlformats.org/drawingml/2006/main" xmlns:r="http://schemas.openxmlformats.org/officeDocument/2006/relationships" xmlns:p="http://schemas.openxmlformats.org/presentationml/2006/main">
   <p:cSld>
     <p:spTree>
@@ -8131,11 +8511,11 @@
             <a:lstStyle/>
             <a:p>
               <a:r>
-                <a:rPr lang="de-DE" dirty="0" smtClean="0"/>
+                <a:rPr lang="de-DE" dirty="0"/>
                 <a:t>Mit </a:t>
               </a:r>
               <a:r>
-                <a:rPr lang="de-DE" dirty="0" err="1" smtClean="0"/>
+                <a:rPr lang="de-DE" dirty="0" err="1"/>
                 <a:t>Fillet</a:t>
               </a:r>
               <a:endParaRPr lang="de-DE" dirty="0"/>
@@ -8165,11 +8545,11 @@
             <a:lstStyle/>
             <a:p>
               <a:r>
-                <a:rPr lang="de-DE" dirty="0" smtClean="0"/>
+                <a:rPr lang="de-DE" dirty="0"/>
                 <a:t>Ohne </a:t>
               </a:r>
               <a:r>
-                <a:rPr lang="de-DE" dirty="0" err="1" smtClean="0"/>
+                <a:rPr lang="de-DE" dirty="0" err="1"/>
                 <a:t>Fillet</a:t>
               </a:r>
               <a:endParaRPr lang="de-DE" dirty="0"/>
@@ -8190,7 +8570,7 @@
 </p:sld>
 </file>
 
-<file path=ppt/slides/slide7.xml><?xml version="1.0" encoding="utf-8"?>
+<file path=ppt/slides/slide8.xml><?xml version="1.0" encoding="utf-8"?>
 <p:sld xmlns:a="http://schemas.openxmlformats.org/drawingml/2006/main" xmlns:r="http://schemas.openxmlformats.org/officeDocument/2006/relationships" xmlns:p="http://schemas.openxmlformats.org/presentationml/2006/main">
   <p:cSld>
     <p:spTree>
@@ -8223,10 +8603,9 @@
           <a:lstStyle/>
           <a:p>
             <a:r>
-              <a:rPr lang="de-DE" dirty="0" smtClean="0"/>
+              <a:rPr lang="de-DE" dirty="0"/>
               <a:t>Eintrittstemperatur variieren</a:t>
             </a:r>
-            <a:endParaRPr lang="de-DE" dirty="0"/>
           </a:p>
         </p:txBody>
       </p:sp>
@@ -8256,8 +8635,20 @@
                 <a:tableStyleId>{93296810-A885-4BE3-A3E7-6D5BEEA58F35}</a:tableStyleId>
               </a:tblPr>
               <a:tblGrid>
-                <a:gridCol w="3411538"/>
-                <a:gridCol w="3411538"/>
+                <a:gridCol w="3411538">
+                  <a:extLst>
+                    <a:ext uri="{9D8B030D-6E8A-4147-A177-3AD203B41FA5}">
+                      <a16:colId xmlns:a16="http://schemas.microsoft.com/office/drawing/2014/main" val="20000"/>
+                    </a:ext>
+                  </a:extLst>
+                </a:gridCol>
+                <a:gridCol w="3411538">
+                  <a:extLst>
+                    <a:ext uri="{9D8B030D-6E8A-4147-A177-3AD203B41FA5}">
+                      <a16:colId xmlns:a16="http://schemas.microsoft.com/office/drawing/2014/main" val="20001"/>
+                    </a:ext>
+                  </a:extLst>
+                </a:gridCol>
               </a:tblGrid>
               <a:tr h="370840">
                 <a:tc>
@@ -8266,18 +8657,17 @@
                     <a:lstStyle/>
                     <a:p>
                       <a:r>
-                        <a:rPr lang="de-DE" dirty="0" smtClean="0"/>
+                        <a:rPr lang="de-DE" dirty="0"/>
                         <a:t>Total</a:t>
                       </a:r>
                       <a:r>
-                        <a:rPr lang="de-DE" baseline="0" dirty="0" smtClean="0"/>
+                        <a:rPr lang="de-DE" baseline="0" dirty="0"/>
                         <a:t> </a:t>
                       </a:r>
                       <a:r>
-                        <a:rPr lang="de-DE" dirty="0" smtClean="0"/>
+                        <a:rPr lang="de-DE" dirty="0"/>
                         <a:t>Temperatur</a:t>
                       </a:r>
-                      <a:endParaRPr lang="de-DE" dirty="0"/>
                     </a:p>
                   </a:txBody>
                   <a:tcPr/>
@@ -8288,14 +8678,18 @@
                     <a:lstStyle/>
                     <a:p>
                       <a:r>
-                        <a:rPr lang="de-DE" dirty="0" smtClean="0"/>
+                        <a:rPr lang="de-DE" dirty="0"/>
                         <a:t>Total Druck</a:t>
                       </a:r>
-                      <a:endParaRPr lang="de-DE" dirty="0"/>
                     </a:p>
                   </a:txBody>
                   <a:tcPr/>
                 </a:tc>
+                <a:extLst>
+                  <a:ext uri="{0D108BD9-81ED-4DB2-BD59-A6C34878D82A}">
+                    <a16:rowId xmlns:a16="http://schemas.microsoft.com/office/drawing/2014/main" val="10000"/>
+                  </a:ext>
+                </a:extLst>
               </a:tr>
               <a:tr h="370840">
                 <a:tc>
@@ -8304,10 +8698,9 @@
                     <a:lstStyle/>
                     <a:p>
                       <a:r>
-                        <a:rPr lang="de-DE" dirty="0" smtClean="0"/>
+                        <a:rPr lang="de-DE" dirty="0"/>
                         <a:t>305 K</a:t>
                       </a:r>
-                      <a:endParaRPr lang="de-DE" dirty="0"/>
                     </a:p>
                   </a:txBody>
                   <a:tcPr/>
@@ -8318,11 +8711,11 @@
                     <a:lstStyle/>
                     <a:p>
                       <a:r>
-                        <a:rPr lang="de-DE" dirty="0" smtClean="0"/>
+                        <a:rPr lang="de-DE" dirty="0"/>
                         <a:t>150000 </a:t>
                       </a:r>
                       <a:r>
-                        <a:rPr lang="de-DE" dirty="0" err="1" smtClean="0"/>
+                        <a:rPr lang="de-DE" dirty="0" err="1"/>
                         <a:t>Pa</a:t>
                       </a:r>
                       <a:endParaRPr lang="de-DE" dirty="0"/>
@@ -8330,6 +8723,11 @@
                   </a:txBody>
                   <a:tcPr/>
                 </a:tc>
+                <a:extLst>
+                  <a:ext uri="{0D108BD9-81ED-4DB2-BD59-A6C34878D82A}">
+                    <a16:rowId xmlns:a16="http://schemas.microsoft.com/office/drawing/2014/main" val="10001"/>
+                  </a:ext>
+                </a:extLst>
               </a:tr>
               <a:tr h="370840">
                 <a:tc>
@@ -8338,10 +8736,9 @@
                     <a:lstStyle/>
                     <a:p>
                       <a:r>
-                        <a:rPr lang="de-DE" dirty="0" smtClean="0"/>
+                        <a:rPr lang="de-DE" dirty="0"/>
                         <a:t>500 K</a:t>
                       </a:r>
-                      <a:endParaRPr lang="de-DE" dirty="0"/>
                     </a:p>
                   </a:txBody>
                   <a:tcPr/>
@@ -8352,7 +8749,7 @@
                     <a:lstStyle/>
                     <a:p>
                       <a:r>
-                        <a:rPr lang="de-DE" sz="1800" kern="1200" dirty="0" smtClean="0">
+                        <a:rPr lang="de-DE" sz="1800" kern="1200" dirty="0">
                           <a:solidFill>
                             <a:schemeClr val="dk1"/>
                           </a:solidFill>
@@ -8364,7 +8761,7 @@
                         <a:t>192093,73 </a:t>
                       </a:r>
                       <a:r>
-                        <a:rPr lang="de-DE" sz="1800" kern="1200" dirty="0" err="1" smtClean="0">
+                        <a:rPr lang="de-DE" sz="1800" kern="1200" dirty="0" err="1">
                           <a:solidFill>
                             <a:schemeClr val="dk1"/>
                           </a:solidFill>
@@ -8380,6 +8777,11 @@
                   </a:txBody>
                   <a:tcPr/>
                 </a:tc>
+                <a:extLst>
+                  <a:ext uri="{0D108BD9-81ED-4DB2-BD59-A6C34878D82A}">
+                    <a16:rowId xmlns:a16="http://schemas.microsoft.com/office/drawing/2014/main" val="10002"/>
+                  </a:ext>
+                </a:extLst>
               </a:tr>
               <a:tr h="370840">
                 <a:tc>
@@ -8388,10 +8790,9 @@
                     <a:lstStyle/>
                     <a:p>
                       <a:r>
-                        <a:rPr lang="de-DE" dirty="0" smtClean="0"/>
+                        <a:rPr lang="de-DE" dirty="0"/>
                         <a:t>750 K</a:t>
                       </a:r>
-                      <a:endParaRPr lang="de-DE" dirty="0"/>
                     </a:p>
                   </a:txBody>
                   <a:tcPr/>
@@ -8402,7 +8803,7 @@
                     <a:lstStyle/>
                     <a:p>
                       <a:r>
-                        <a:rPr lang="de-DE" sz="1800" kern="1200" dirty="0" smtClean="0">
+                        <a:rPr lang="de-DE" sz="1800" kern="1200" dirty="0">
                           <a:solidFill>
                             <a:schemeClr val="dk1"/>
                           </a:solidFill>
@@ -8414,7 +8815,7 @@
                         <a:t>235217,984 </a:t>
                       </a:r>
                       <a:r>
-                        <a:rPr lang="de-DE" sz="1800" kern="1200" dirty="0" err="1" smtClean="0">
+                        <a:rPr lang="de-DE" sz="1800" kern="1200" dirty="0" err="1">
                           <a:solidFill>
                             <a:schemeClr val="dk1"/>
                           </a:solidFill>
@@ -8430,6 +8831,11 @@
                   </a:txBody>
                   <a:tcPr/>
                 </a:tc>
+                <a:extLst>
+                  <a:ext uri="{0D108BD9-81ED-4DB2-BD59-A6C34878D82A}">
+                    <a16:rowId xmlns:a16="http://schemas.microsoft.com/office/drawing/2014/main" val="10003"/>
+                  </a:ext>
+                </a:extLst>
               </a:tr>
               <a:tr h="370840">
                 <a:tc>
@@ -8438,10 +8844,9 @@
                     <a:lstStyle/>
                     <a:p>
                       <a:r>
-                        <a:rPr lang="de-DE" dirty="0" smtClean="0"/>
+                        <a:rPr lang="de-DE" dirty="0"/>
                         <a:t>1000 K</a:t>
                       </a:r>
-                      <a:endParaRPr lang="de-DE" dirty="0"/>
                     </a:p>
                   </a:txBody>
                   <a:tcPr/>
@@ -8452,7 +8857,7 @@
                     <a:lstStyle/>
                     <a:p>
                       <a:r>
-                        <a:rPr lang="de-DE" sz="1800" kern="1200" dirty="0" smtClean="0">
+                        <a:rPr lang="de-DE" sz="1800" kern="1200" dirty="0">
                           <a:solidFill>
                             <a:schemeClr val="dk1"/>
                           </a:solidFill>
@@ -8464,7 +8869,7 @@
                         <a:t>271607,7134 </a:t>
                       </a:r>
                       <a:r>
-                        <a:rPr lang="de-DE" sz="1800" kern="1200" dirty="0" err="1" smtClean="0">
+                        <a:rPr lang="de-DE" sz="1800" kern="1200" dirty="0" err="1">
                           <a:solidFill>
                             <a:schemeClr val="dk1"/>
                           </a:solidFill>
@@ -8480,6 +8885,11 @@
                   </a:txBody>
                   <a:tcPr/>
                 </a:tc>
+                <a:extLst>
+                  <a:ext uri="{0D108BD9-81ED-4DB2-BD59-A6C34878D82A}">
+                    <a16:rowId xmlns:a16="http://schemas.microsoft.com/office/drawing/2014/main" val="10004"/>
+                  </a:ext>
+                </a:extLst>
               </a:tr>
               <a:tr h="370840">
                 <a:tc>
@@ -8488,10 +8898,9 @@
                     <a:lstStyle/>
                     <a:p>
                       <a:r>
-                        <a:rPr lang="de-DE" dirty="0" smtClean="0"/>
+                        <a:rPr lang="de-DE" dirty="0"/>
                         <a:t>1500 K</a:t>
                       </a:r>
-                      <a:endParaRPr lang="de-DE" dirty="0"/>
                     </a:p>
                   </a:txBody>
                   <a:tcPr/>
@@ -8502,7 +8911,7 @@
                     <a:lstStyle/>
                     <a:p>
                       <a:r>
-                        <a:rPr lang="de-DE" sz="1800" kern="1200" dirty="0" smtClean="0">
+                        <a:rPr lang="de-DE" sz="1800" kern="1200" dirty="0">
                           <a:solidFill>
                             <a:schemeClr val="dk1"/>
                           </a:solidFill>
@@ -8514,7 +8923,7 @@
                         <a:t>332648,4631 </a:t>
                       </a:r>
                       <a:r>
-                        <a:rPr lang="de-DE" sz="1800" kern="1200" dirty="0" err="1" smtClean="0">
+                        <a:rPr lang="de-DE" sz="1800" kern="1200" dirty="0" err="1">
                           <a:solidFill>
                             <a:schemeClr val="dk1"/>
                           </a:solidFill>
@@ -8530,6 +8939,11 @@
                   </a:txBody>
                   <a:tcPr/>
                 </a:tc>
+                <a:extLst>
+                  <a:ext uri="{0D108BD9-81ED-4DB2-BD59-A6C34878D82A}">
+                    <a16:rowId xmlns:a16="http://schemas.microsoft.com/office/drawing/2014/main" val="10005"/>
+                  </a:ext>
+                </a:extLst>
               </a:tr>
               <a:tr h="370840">
                 <a:tc>
@@ -8538,10 +8952,9 @@
                     <a:lstStyle/>
                     <a:p>
                       <a:r>
-                        <a:rPr lang="de-DE" dirty="0" smtClean="0"/>
+                        <a:rPr lang="de-DE" dirty="0"/>
                         <a:t>2000 K</a:t>
                       </a:r>
-                      <a:endParaRPr lang="de-DE" dirty="0"/>
                     </a:p>
                   </a:txBody>
                   <a:tcPr/>
@@ -8552,7 +8965,7 @@
                     <a:lstStyle/>
                     <a:p>
                       <a:r>
-                        <a:rPr lang="de-DE" sz="1800" kern="1200" dirty="0" smtClean="0">
+                        <a:rPr lang="de-DE" sz="1800" kern="1200" dirty="0">
                           <a:solidFill>
                             <a:schemeClr val="dk1"/>
                           </a:solidFill>
@@ -8564,7 +8977,7 @@
                         <a:t>384111,312 </a:t>
                       </a:r>
                       <a:r>
-                        <a:rPr lang="de-DE" sz="1800" kern="1200" dirty="0" err="1" smtClean="0">
+                        <a:rPr lang="de-DE" sz="1800" kern="1200" dirty="0" err="1">
                           <a:solidFill>
                             <a:schemeClr val="dk1"/>
                           </a:solidFill>
@@ -8580,6 +8993,11 @@
                   </a:txBody>
                   <a:tcPr/>
                 </a:tc>
+                <a:extLst>
+                  <a:ext uri="{0D108BD9-81ED-4DB2-BD59-A6C34878D82A}">
+                    <a16:rowId xmlns:a16="http://schemas.microsoft.com/office/drawing/2014/main" val="10006"/>
+                  </a:ext>
+                </a:extLst>
               </a:tr>
               <a:tr h="370840">
                 <a:tc>
@@ -8588,10 +9006,9 @@
                     <a:lstStyle/>
                     <a:p>
                       <a:r>
-                        <a:rPr lang="de-DE" dirty="0" smtClean="0"/>
+                        <a:rPr lang="de-DE" dirty="0"/>
                         <a:t>2500 K</a:t>
                       </a:r>
-                      <a:endParaRPr lang="de-DE" dirty="0"/>
                     </a:p>
                   </a:txBody>
                   <a:tcPr/>
@@ -8602,7 +9019,7 @@
                     <a:lstStyle/>
                     <a:p>
                       <a:r>
-                        <a:rPr lang="de-DE" sz="1800" kern="1200" dirty="0" smtClean="0">
+                        <a:rPr lang="de-DE" sz="1800" kern="1200" dirty="0">
                           <a:solidFill>
                             <a:schemeClr val="dk1"/>
                           </a:solidFill>
@@ -8614,7 +9031,7 @@
                         <a:t>429448,1925 </a:t>
                       </a:r>
                       <a:r>
-                        <a:rPr lang="de-DE" sz="1800" kern="1200" dirty="0" err="1" smtClean="0">
+                        <a:rPr lang="de-DE" sz="1800" kern="1200" dirty="0" err="1">
                           <a:solidFill>
                             <a:schemeClr val="dk1"/>
                           </a:solidFill>
@@ -8630,6 +9047,11 @@
                   </a:txBody>
                   <a:tcPr/>
                 </a:tc>
+                <a:extLst>
+                  <a:ext uri="{0D108BD9-81ED-4DB2-BD59-A6C34878D82A}">
+                    <a16:rowId xmlns:a16="http://schemas.microsoft.com/office/drawing/2014/main" val="10007"/>
+                  </a:ext>
+                </a:extLst>
               </a:tr>
             </a:tbl>
           </a:graphicData>
@@ -10110,4 +10532,18 @@
   <a:objectDefaults/>
   <a:extraClrSchemeLst/>
 </a:theme>
+</file>
+
+<file path=customXml/item1.xml><?xml version="1.0" encoding="utf-8"?>
+<Control xmlns="http://schemas.microsoft.com/VisualStudio/2011/storyboarding/control">
+  <Id Name="58e92fa2-ebce-4d8a-86e9-d1e0cd537b74" Revision="1" Stencil="System.MyShapes" StencilVersion="1.0"/>
+</Control>
+</file>
+
+<file path=customXml/itemProps1.xml><?xml version="1.0" encoding="utf-8"?>
+<ds:datastoreItem xmlns:ds="http://schemas.openxmlformats.org/officeDocument/2006/customXml" ds:itemID="{54FB2B7C-7ED4-42F4-9954-2C6818074D42}">
+  <ds:schemaRefs>
+    <ds:schemaRef ds:uri="http://schemas.microsoft.com/VisualStudio/2011/storyboarding/control"/>
+  </ds:schemaRefs>
+</ds:datastoreItem>
 </file>
</xml_diff>